<commit_message>
Presentation - Minor Updates
</commit_message>
<xml_diff>
--- a/presentation/COMS_Qualifying_Exam-2023-08-21.pptx
+++ b/presentation/COMS_Qualifying_Exam-2023-08-21.pptx
@@ -5,7 +5,7 @@
     <p:sldMasterId id="2147483686" r:id="rId1"/>
   </p:sldMasterIdLst>
   <p:notesMasterIdLst>
-    <p:notesMasterId r:id="rId27"/>
+    <p:notesMasterId r:id="rId28"/>
   </p:notesMasterIdLst>
   <p:sldIdLst>
     <p:sldId id="287" r:id="rId2"/>
@@ -26,13 +26,14 @@
     <p:sldId id="284" r:id="rId17"/>
     <p:sldId id="285" r:id="rId18"/>
     <p:sldId id="271" r:id="rId19"/>
-    <p:sldId id="272" r:id="rId20"/>
-    <p:sldId id="273" r:id="rId21"/>
-    <p:sldId id="274" r:id="rId22"/>
-    <p:sldId id="275" r:id="rId23"/>
-    <p:sldId id="276" r:id="rId24"/>
-    <p:sldId id="267" r:id="rId25"/>
-    <p:sldId id="279" r:id="rId26"/>
+    <p:sldId id="288" r:id="rId20"/>
+    <p:sldId id="272" r:id="rId21"/>
+    <p:sldId id="273" r:id="rId22"/>
+    <p:sldId id="274" r:id="rId23"/>
+    <p:sldId id="275" r:id="rId24"/>
+    <p:sldId id="276" r:id="rId25"/>
+    <p:sldId id="267" r:id="rId26"/>
+    <p:sldId id="279" r:id="rId27"/>
   </p:sldIdLst>
   <p:sldSz cx="12192000" cy="6858000"/>
   <p:notesSz cx="6858000" cy="9144000"/>
@@ -15246,7 +15247,7 @@
           <a:p>
             <a:fld id="{FD159B06-F1D2-CA44-B076-5D4430A352F2}" type="datetimeFigureOut">
               <a:rPr lang="en-US" smtClean="0"/>
-              <a:t>8/21/23</a:t>
+              <a:t>8/22/23</a:t>
             </a:fld>
             <a:endParaRPr lang="en-US"/>
           </a:p>
@@ -15662,7 +15663,7 @@
           <a:p>
             <a:fld id="{C910F56A-5384-CC40-A3B4-A869BEE484DE}" type="slidenum">
               <a:rPr lang="en-US" smtClean="0"/>
-              <a:t>24</a:t>
+              <a:t>25</a:t>
             </a:fld>
             <a:endParaRPr lang="en-US"/>
           </a:p>
@@ -16163,7 +16164,7 @@
                 </a:solidFill>
               </a:rPr>
               <a:pPr algn="r"/>
-              <a:t>8/21/23</a:t>
+              <a:t>8/22/23</a:t>
             </a:fld>
             <a:r>
               <a:rPr lang="en-US" sz="1050" dirty="0">
@@ -16931,7 +16932,7 @@
           <a:p>
             <a:r>
               <a:rPr lang="en-US" dirty="0"/>
-              <a:t>The German data was obtained from the dataset built by ETH’s Emotion and Stance Detection for German Text[4].</a:t>
+              <a:t>The German data was obtained from the dataset built by ETH’s Emotion and Stance Detection for German Text[4] based on voting feedback.</a:t>
             </a:r>
           </a:p>
           <a:p>
@@ -16943,7 +16944,7 @@
           <a:p>
             <a:r>
               <a:rPr lang="en-US" dirty="0"/>
-              <a:t>Unfortunately there was a large quantity difference between German and English!</a:t>
+              <a:t>Unfortunately, there was a large quantity difference between German and English!</a:t>
             </a:r>
           </a:p>
         </p:txBody>
@@ -18370,19 +18371,19 @@
           <a:p>
             <a:r>
               <a:rPr lang="en-US" dirty="0"/>
-              <a:t>By use of Jupyter Notebooks the English (csv) and German (JSON) files were.</a:t>
+              <a:t>By use of Jupyter Notebooks the English (csv) and German (JSON) files were read and processed ease of demo.</a:t>
             </a:r>
           </a:p>
           <a:p>
             <a:r>
               <a:rPr lang="en-US" dirty="0"/>
-              <a:t>For processing I opted to use Pandas.</a:t>
+              <a:t>For processing I opted to use Pandas over PySpark.</a:t>
             </a:r>
           </a:p>
           <a:p>
             <a:r>
               <a:rPr lang="en-US" dirty="0"/>
-              <a:t>Google Translator was use for Translation</a:t>
+              <a:t>Google Translator was used for Translation – Their API is Free!</a:t>
             </a:r>
           </a:p>
         </p:txBody>
@@ -19296,7 +19297,7 @@
         <p:spPr>
           <a:xfrm>
             <a:off x="1134617" y="1201821"/>
-            <a:ext cx="6114080" cy="5170646"/>
+            <a:ext cx="6969148" cy="5262979"/>
           </a:xfrm>
           <a:prstGeom prst="rect">
             <a:avLst/>
@@ -19323,7 +19324,7 @@
           <a:lstStyle/>
           <a:p>
             <a:r>
-              <a:rPr lang="en-US" sz="1000" dirty="0">
+              <a:rPr lang="en-US" sz="1050" dirty="0">
                 <a:solidFill>
                   <a:srgbClr val="6A9955"/>
                 </a:solidFill>
@@ -19334,7 +19335,7 @@
           </a:p>
           <a:p>
             <a:r>
-              <a:rPr lang="en-US" sz="1000" b="0" dirty="0">
+              <a:rPr lang="en-US" sz="1050" b="0" dirty="0">
                 <a:solidFill>
                   <a:srgbClr val="6A9955"/>
                 </a:solidFill>
@@ -19343,7 +19344,7 @@
               </a:rPr>
               <a:t># Merge German Emotions onto English</a:t>
             </a:r>
-            <a:endParaRPr lang="en-US" sz="1000" b="0" dirty="0">
+            <a:endParaRPr lang="en-US" sz="1050" b="0" dirty="0">
               <a:solidFill>
                 <a:srgbClr val="CCCCCC"/>
               </a:solidFill>
@@ -19353,7 +19354,7 @@
           </a:p>
           <a:p>
             <a:r>
-              <a:rPr lang="en-US" sz="1000" b="0" dirty="0" err="1">
+              <a:rPr lang="en-US" sz="1050" b="0" dirty="0" err="1">
                 <a:solidFill>
                   <a:srgbClr val="9CDCFE"/>
                 </a:solidFill>
@@ -19363,7 +19364,7 @@
               <a:t>df_en</a:t>
             </a:r>
             <a:r>
-              <a:rPr lang="en-US" sz="1000" b="0" dirty="0">
+              <a:rPr lang="en-US" sz="1050" b="0" dirty="0">
                 <a:solidFill>
                   <a:srgbClr val="CCCCCC"/>
                 </a:solidFill>
@@ -19373,7 +19374,7 @@
               <a:t> </a:t>
             </a:r>
             <a:r>
-              <a:rPr lang="en-US" sz="1000" b="0" dirty="0">
+              <a:rPr lang="en-US" sz="1050" b="0" dirty="0">
                 <a:solidFill>
                   <a:srgbClr val="D4D4D4"/>
                 </a:solidFill>
@@ -19383,7 +19384,7 @@
               <a:t>=</a:t>
             </a:r>
             <a:r>
-              <a:rPr lang="en-US" sz="1000" b="0" dirty="0">
+              <a:rPr lang="en-US" sz="1050" b="0" dirty="0">
                 <a:solidFill>
                   <a:srgbClr val="CCCCCC"/>
                 </a:solidFill>
@@ -19393,7 +19394,7 @@
               <a:t> </a:t>
             </a:r>
             <a:r>
-              <a:rPr lang="en-US" sz="1000" b="0" dirty="0" err="1">
+              <a:rPr lang="en-US" sz="1050" b="0" dirty="0" err="1">
                 <a:solidFill>
                   <a:srgbClr val="4EC9B0"/>
                 </a:solidFill>
@@ -19403,7 +19404,7 @@
               <a:t>pd</a:t>
             </a:r>
             <a:r>
-              <a:rPr lang="en-US" sz="1000" b="0" dirty="0" err="1">
+              <a:rPr lang="en-US" sz="1050" b="0" dirty="0" err="1">
                 <a:solidFill>
                   <a:srgbClr val="CCCCCC"/>
                 </a:solidFill>
@@ -19413,7 +19414,7 @@
               <a:t>.</a:t>
             </a:r>
             <a:r>
-              <a:rPr lang="en-US" sz="1000" b="0" dirty="0" err="1">
+              <a:rPr lang="en-US" sz="1050" b="0" dirty="0" err="1">
                 <a:solidFill>
                   <a:srgbClr val="DCDCAA"/>
                 </a:solidFill>
@@ -19423,7 +19424,7 @@
               <a:t>merge</a:t>
             </a:r>
             <a:r>
-              <a:rPr lang="en-US" sz="1000" b="0" dirty="0">
+              <a:rPr lang="en-US" sz="1050" b="0" dirty="0">
                 <a:solidFill>
                   <a:srgbClr val="CCCCCC"/>
                 </a:solidFill>
@@ -19433,7 +19434,7 @@
               <a:t>(</a:t>
             </a:r>
             <a:r>
-              <a:rPr lang="en-US" sz="1000" b="0" dirty="0" err="1">
+              <a:rPr lang="en-US" sz="1050" b="0" dirty="0" err="1">
                 <a:solidFill>
                   <a:srgbClr val="9CDCFE"/>
                 </a:solidFill>
@@ -19443,7 +19444,7 @@
               <a:t>df_en</a:t>
             </a:r>
             <a:r>
-              <a:rPr lang="en-US" sz="1000" b="0" dirty="0">
+              <a:rPr lang="en-US" sz="1050" b="0" dirty="0">
                 <a:solidFill>
                   <a:srgbClr val="CCCCCC"/>
                 </a:solidFill>
@@ -19453,7 +19454,7 @@
               <a:t>, </a:t>
             </a:r>
             <a:r>
-              <a:rPr lang="en-US" sz="1000" b="0" dirty="0" err="1">
+              <a:rPr lang="en-US" sz="1050" b="0" dirty="0" err="1">
                 <a:solidFill>
                   <a:srgbClr val="9CDCFE"/>
                 </a:solidFill>
@@ -19463,7 +19464,7 @@
               <a:t>df_emotions</a:t>
             </a:r>
             <a:r>
-              <a:rPr lang="en-US" sz="1000" b="0" dirty="0">
+              <a:rPr lang="en-US" sz="1050" b="0" dirty="0">
                 <a:solidFill>
                   <a:srgbClr val="CCCCCC"/>
                 </a:solidFill>
@@ -19473,7 +19474,7 @@
               <a:t>, </a:t>
             </a:r>
             <a:r>
-              <a:rPr lang="en-US" sz="1000" b="0" dirty="0">
+              <a:rPr lang="en-US" sz="1050" b="0" dirty="0">
                 <a:solidFill>
                   <a:srgbClr val="9CDCFE"/>
                 </a:solidFill>
@@ -19483,7 +19484,7 @@
               <a:t>on</a:t>
             </a:r>
             <a:r>
-              <a:rPr lang="en-US" sz="1000" b="0" dirty="0">
+              <a:rPr lang="en-US" sz="1050" b="0" dirty="0">
                 <a:solidFill>
                   <a:srgbClr val="D4D4D4"/>
                 </a:solidFill>
@@ -19493,7 +19494,7 @@
               <a:t>=</a:t>
             </a:r>
             <a:r>
-              <a:rPr lang="en-US" sz="1000" b="0" dirty="0">
+              <a:rPr lang="en-US" sz="1050" b="0" dirty="0">
                 <a:solidFill>
                   <a:srgbClr val="CE9178"/>
                 </a:solidFill>
@@ -19503,7 +19504,7 @@
               <a:t>'</a:t>
             </a:r>
             <a:r>
-              <a:rPr lang="en-US" sz="1000" b="0" dirty="0" err="1">
+              <a:rPr lang="en-US" sz="1050" b="0" dirty="0" err="1">
                 <a:solidFill>
                   <a:srgbClr val="CE9178"/>
                 </a:solidFill>
@@ -19513,7 +19514,7 @@
               <a:t>emotion_en</a:t>
             </a:r>
             <a:r>
-              <a:rPr lang="en-US" sz="1000" b="0" dirty="0">
+              <a:rPr lang="en-US" sz="1050" b="0" dirty="0">
                 <a:solidFill>
                   <a:srgbClr val="CE9178"/>
                 </a:solidFill>
@@ -19523,7 +19524,7 @@
               <a:t>'</a:t>
             </a:r>
             <a:r>
-              <a:rPr lang="en-US" sz="1000" b="0" dirty="0">
+              <a:rPr lang="en-US" sz="1050" b="0" dirty="0">
                 <a:solidFill>
                   <a:srgbClr val="CCCCCC"/>
                 </a:solidFill>
@@ -19533,7 +19534,7 @@
               <a:t>, </a:t>
             </a:r>
             <a:r>
-              <a:rPr lang="en-US" sz="1000" b="0" dirty="0">
+              <a:rPr lang="en-US" sz="1050" b="0" dirty="0">
                 <a:solidFill>
                   <a:srgbClr val="9CDCFE"/>
                 </a:solidFill>
@@ -19543,7 +19544,7 @@
               <a:t>how</a:t>
             </a:r>
             <a:r>
-              <a:rPr lang="en-US" sz="1000" b="0" dirty="0">
+              <a:rPr lang="en-US" sz="1050" b="0" dirty="0">
                 <a:solidFill>
                   <a:srgbClr val="D4D4D4"/>
                 </a:solidFill>
@@ -19553,7 +19554,7 @@
               <a:t>=</a:t>
             </a:r>
             <a:r>
-              <a:rPr lang="en-US" sz="1000" b="0" dirty="0">
+              <a:rPr lang="en-US" sz="1050" b="0" dirty="0">
                 <a:solidFill>
                   <a:srgbClr val="CE9178"/>
                 </a:solidFill>
@@ -19563,7 +19564,7 @@
               <a:t>'left’</a:t>
             </a:r>
             <a:r>
-              <a:rPr lang="en-US" sz="1000" b="0" dirty="0">
+              <a:rPr lang="en-US" sz="1050" b="0" dirty="0">
                 <a:solidFill>
                   <a:srgbClr val="CCCCCC"/>
                 </a:solidFill>
@@ -19574,7 +19575,7 @@
             </a:r>
           </a:p>
           <a:p>
-            <a:endParaRPr lang="en-US" sz="1000" b="0" dirty="0">
+            <a:endParaRPr lang="en-US" sz="1050" b="0" dirty="0">
               <a:solidFill>
                 <a:srgbClr val="CCCCCC"/>
               </a:solidFill>
@@ -19584,7 +19585,7 @@
           </a:p>
           <a:p>
             <a:r>
-              <a:rPr lang="en-US" sz="1000" b="0" dirty="0">
+              <a:rPr lang="en-US" sz="1050" b="0" dirty="0">
                 <a:solidFill>
                   <a:srgbClr val="6A9955"/>
                 </a:solidFill>
@@ -19596,7 +19597,7 @@
           </a:p>
           <a:p>
             <a:r>
-              <a:rPr lang="en-US" sz="1000" dirty="0">
+              <a:rPr lang="en-US" sz="1050" dirty="0">
                 <a:solidFill>
                   <a:srgbClr val="6A9955"/>
                 </a:solidFill>
@@ -19605,7 +19606,7 @@
               <a:t># </a:t>
             </a:r>
             <a:r>
-              <a:rPr lang="en-US" sz="1000" b="0" dirty="0">
+              <a:rPr lang="en-US" sz="1050" b="0" dirty="0">
                 <a:solidFill>
                   <a:srgbClr val="6A9955"/>
                 </a:solidFill>
@@ -19614,7 +19615,7 @@
               </a:rPr>
               <a:t>Add German Sentence Column</a:t>
             </a:r>
-            <a:endParaRPr lang="en-US" sz="1000" b="0" dirty="0">
+            <a:endParaRPr lang="en-US" sz="1050" b="0" dirty="0">
               <a:solidFill>
                 <a:srgbClr val="CCCCCC"/>
               </a:solidFill>
@@ -19624,7 +19625,7 @@
           </a:p>
           <a:p>
             <a:r>
-              <a:rPr lang="en-US" sz="1000" b="0" dirty="0" err="1">
+              <a:rPr lang="en-US" sz="1050" b="0" dirty="0" err="1">
                 <a:solidFill>
                   <a:srgbClr val="9CDCFE"/>
                 </a:solidFill>
@@ -19634,7 +19635,7 @@
               <a:t>df_en</a:t>
             </a:r>
             <a:r>
-              <a:rPr lang="en-US" sz="1000" b="0" dirty="0">
+              <a:rPr lang="en-US" sz="1050" b="0" dirty="0">
                 <a:solidFill>
                   <a:srgbClr val="CCCCCC"/>
                 </a:solidFill>
@@ -19644,7 +19645,7 @@
               <a:t>[</a:t>
             </a:r>
             <a:r>
-              <a:rPr lang="en-US" sz="1000" b="0" dirty="0">
+              <a:rPr lang="en-US" sz="1050" b="0" dirty="0">
                 <a:solidFill>
                   <a:srgbClr val="CE9178"/>
                 </a:solidFill>
@@ -19654,7 +19655,7 @@
               <a:t>"</a:t>
             </a:r>
             <a:r>
-              <a:rPr lang="en-US" sz="1000" b="0" dirty="0" err="1">
+              <a:rPr lang="en-US" sz="1050" b="0" dirty="0" err="1">
                 <a:solidFill>
                   <a:srgbClr val="CE9178"/>
                 </a:solidFill>
@@ -19664,7 +19665,7 @@
               <a:t>sentence_de</a:t>
             </a:r>
             <a:r>
-              <a:rPr lang="en-US" sz="1000" b="0" dirty="0">
+              <a:rPr lang="en-US" sz="1050" b="0" dirty="0">
                 <a:solidFill>
                   <a:srgbClr val="CE9178"/>
                 </a:solidFill>
@@ -19674,7 +19675,7 @@
               <a:t>"</a:t>
             </a:r>
             <a:r>
-              <a:rPr lang="en-US" sz="1000" b="0" dirty="0">
+              <a:rPr lang="en-US" sz="1050" b="0" dirty="0">
                 <a:solidFill>
                   <a:srgbClr val="CCCCCC"/>
                 </a:solidFill>
@@ -19684,7 +19685,7 @@
               <a:t>] </a:t>
             </a:r>
             <a:r>
-              <a:rPr lang="en-US" sz="1000" b="0" dirty="0">
+              <a:rPr lang="en-US" sz="1050" b="0" dirty="0">
                 <a:solidFill>
                   <a:srgbClr val="D4D4D4"/>
                 </a:solidFill>
@@ -19694,7 +19695,7 @@
               <a:t>=</a:t>
             </a:r>
             <a:r>
-              <a:rPr lang="en-US" sz="1000" b="0" dirty="0">
+              <a:rPr lang="en-US" sz="1050" b="0" dirty="0">
                 <a:solidFill>
                   <a:srgbClr val="CCCCCC"/>
                 </a:solidFill>
@@ -19704,7 +19705,7 @@
               <a:t> </a:t>
             </a:r>
             <a:r>
-              <a:rPr lang="en-US" sz="1000" b="0" dirty="0">
+              <a:rPr lang="en-US" sz="1050" b="0" dirty="0">
                 <a:solidFill>
                   <a:srgbClr val="CE9178"/>
                 </a:solidFill>
@@ -19713,7 +19714,7 @@
               </a:rPr>
               <a:t>""</a:t>
             </a:r>
-            <a:endParaRPr lang="en-US" sz="1000" b="0" dirty="0">
+            <a:endParaRPr lang="en-US" sz="1050" b="0" dirty="0">
               <a:solidFill>
                 <a:srgbClr val="CCCCCC"/>
               </a:solidFill>
@@ -19723,7 +19724,7 @@
           </a:p>
           <a:p>
             <a:br>
-              <a:rPr lang="en-US" sz="1000" b="0" dirty="0">
+              <a:rPr lang="en-US" sz="1050" b="0" dirty="0">
                 <a:solidFill>
                   <a:srgbClr val="CCCCCC"/>
                 </a:solidFill>
@@ -19732,7 +19733,7 @@
               </a:rPr>
             </a:br>
             <a:r>
-              <a:rPr lang="en-US" sz="1000" b="0" dirty="0">
+              <a:rPr lang="en-US" sz="1050" b="0" dirty="0">
                 <a:solidFill>
                   <a:srgbClr val="6A9955"/>
                 </a:solidFill>
@@ -19744,7 +19745,7 @@
           </a:p>
           <a:p>
             <a:r>
-              <a:rPr lang="en-US" sz="1000" dirty="0">
+              <a:rPr lang="en-US" sz="1050" dirty="0">
                 <a:solidFill>
                   <a:srgbClr val="6A9955"/>
                 </a:solidFill>
@@ -19753,7 +19754,7 @@
               <a:t># </a:t>
             </a:r>
             <a:r>
-              <a:rPr lang="en-US" sz="1000" b="0" dirty="0">
+              <a:rPr lang="en-US" sz="1050" b="0" dirty="0">
                 <a:solidFill>
                   <a:srgbClr val="6A9955"/>
                 </a:solidFill>
@@ -19762,7 +19763,7 @@
               </a:rPr>
               <a:t>Randomly select 1500 rows</a:t>
             </a:r>
-            <a:endParaRPr lang="en-US" sz="1000" b="0" dirty="0">
+            <a:endParaRPr lang="en-US" sz="1050" b="0" dirty="0">
               <a:solidFill>
                 <a:srgbClr val="CCCCCC"/>
               </a:solidFill>
@@ -19772,7 +19773,7 @@
           </a:p>
           <a:p>
             <a:r>
-              <a:rPr lang="en-US" sz="1000" b="0" dirty="0" err="1">
+              <a:rPr lang="en-US" sz="1050" b="0" dirty="0" err="1">
                 <a:solidFill>
                   <a:srgbClr val="9CDCFE"/>
                 </a:solidFill>
@@ -19782,7 +19783,7 @@
               <a:t>df_en</a:t>
             </a:r>
             <a:r>
-              <a:rPr lang="en-US" sz="1000" b="0" dirty="0">
+              <a:rPr lang="en-US" sz="1050" b="0" dirty="0">
                 <a:solidFill>
                   <a:srgbClr val="CCCCCC"/>
                 </a:solidFill>
@@ -19792,7 +19793,7 @@
               <a:t> </a:t>
             </a:r>
             <a:r>
-              <a:rPr lang="en-US" sz="1000" b="0" dirty="0">
+              <a:rPr lang="en-US" sz="1050" b="0" dirty="0">
                 <a:solidFill>
                   <a:srgbClr val="D4D4D4"/>
                 </a:solidFill>
@@ -19802,7 +19803,7 @@
               <a:t>=</a:t>
             </a:r>
             <a:r>
-              <a:rPr lang="en-US" sz="1000" b="0" dirty="0">
+              <a:rPr lang="en-US" sz="1050" b="0" dirty="0">
                 <a:solidFill>
                   <a:srgbClr val="CCCCCC"/>
                 </a:solidFill>
@@ -19812,7 +19813,7 @@
               <a:t> </a:t>
             </a:r>
             <a:r>
-              <a:rPr lang="en-US" sz="1000" b="0" dirty="0" err="1">
+              <a:rPr lang="en-US" sz="1050" b="0" dirty="0" err="1">
                 <a:solidFill>
                   <a:srgbClr val="9CDCFE"/>
                 </a:solidFill>
@@ -19822,7 +19823,7 @@
               <a:t>df_en</a:t>
             </a:r>
             <a:r>
-              <a:rPr lang="en-US" sz="1000" b="0" dirty="0" err="1">
+              <a:rPr lang="en-US" sz="1050" b="0" dirty="0" err="1">
                 <a:solidFill>
                   <a:srgbClr val="CCCCCC"/>
                 </a:solidFill>
@@ -19832,7 +19833,7 @@
               <a:t>.</a:t>
             </a:r>
             <a:r>
-              <a:rPr lang="en-US" sz="1000" b="0" dirty="0" err="1">
+              <a:rPr lang="en-US" sz="1050" b="0" dirty="0" err="1">
                 <a:solidFill>
                   <a:srgbClr val="DCDCAA"/>
                 </a:solidFill>
@@ -19842,7 +19843,7 @@
               <a:t>sample</a:t>
             </a:r>
             <a:r>
-              <a:rPr lang="en-US" sz="1000" b="0" dirty="0">
+              <a:rPr lang="en-US" sz="1050" b="0" dirty="0">
                 <a:solidFill>
                   <a:srgbClr val="CCCCCC"/>
                 </a:solidFill>
@@ -19852,7 +19853,7 @@
               <a:t>(</a:t>
             </a:r>
             <a:r>
-              <a:rPr lang="en-US" sz="1000" b="0" dirty="0">
+              <a:rPr lang="en-US" sz="1050" b="0" dirty="0">
                 <a:solidFill>
                   <a:srgbClr val="9CDCFE"/>
                 </a:solidFill>
@@ -19862,7 +19863,7 @@
               <a:t>n</a:t>
             </a:r>
             <a:r>
-              <a:rPr lang="en-US" sz="1000" b="0" dirty="0">
+              <a:rPr lang="en-US" sz="1050" b="0" dirty="0">
                 <a:solidFill>
                   <a:srgbClr val="D4D4D4"/>
                 </a:solidFill>
@@ -19872,7 +19873,7 @@
               <a:t>=</a:t>
             </a:r>
             <a:r>
-              <a:rPr lang="en-US" sz="1000" b="0" dirty="0">
+              <a:rPr lang="en-US" sz="1050" b="0" dirty="0">
                 <a:solidFill>
                   <a:srgbClr val="B5CEA8"/>
                 </a:solidFill>
@@ -19882,7 +19883,7 @@
               <a:t>1500</a:t>
             </a:r>
             <a:r>
-              <a:rPr lang="en-US" sz="1000" b="0" dirty="0">
+              <a:rPr lang="en-US" sz="1050" b="0" dirty="0">
                 <a:solidFill>
                   <a:srgbClr val="CCCCCC"/>
                 </a:solidFill>
@@ -19892,7 +19893,7 @@
               <a:t>, </a:t>
             </a:r>
             <a:r>
-              <a:rPr lang="en-US" sz="1000" b="0" dirty="0" err="1">
+              <a:rPr lang="en-US" sz="1050" b="0" dirty="0" err="1">
                 <a:solidFill>
                   <a:srgbClr val="9CDCFE"/>
                 </a:solidFill>
@@ -19902,7 +19903,7 @@
               <a:t>random_state</a:t>
             </a:r>
             <a:r>
-              <a:rPr lang="en-US" sz="1000" b="0" dirty="0">
+              <a:rPr lang="en-US" sz="1050" b="0" dirty="0">
                 <a:solidFill>
                   <a:srgbClr val="D4D4D4"/>
                 </a:solidFill>
@@ -19912,7 +19913,7 @@
               <a:t>=</a:t>
             </a:r>
             <a:r>
-              <a:rPr lang="en-US" sz="1000" b="0" dirty="0">
+              <a:rPr lang="en-US" sz="1050" b="0" dirty="0">
                 <a:solidFill>
                   <a:srgbClr val="B5CEA8"/>
                 </a:solidFill>
@@ -19922,7 +19923,7 @@
               <a:t>2023</a:t>
             </a:r>
             <a:r>
-              <a:rPr lang="en-US" sz="1000" b="0" dirty="0">
+              <a:rPr lang="en-US" sz="1050" b="0" dirty="0">
                 <a:solidFill>
                   <a:srgbClr val="CCCCCC"/>
                 </a:solidFill>
@@ -19933,7 +19934,7 @@
             </a:r>
           </a:p>
           <a:p>
-            <a:endParaRPr lang="en-US" sz="1000" b="0" dirty="0">
+            <a:endParaRPr lang="en-US" sz="1050" b="0" dirty="0">
               <a:solidFill>
                 <a:srgbClr val="CCCCCC"/>
               </a:solidFill>
@@ -19943,7 +19944,7 @@
           </a:p>
           <a:p>
             <a:r>
-              <a:rPr lang="en-US" sz="1000" b="0" dirty="0">
+              <a:rPr lang="en-US" sz="1050" b="0" dirty="0">
                 <a:solidFill>
                   <a:srgbClr val="6A9955"/>
                 </a:solidFill>
@@ -19955,7 +19956,7 @@
           </a:p>
           <a:p>
             <a:r>
-              <a:rPr lang="en-US" sz="1000" dirty="0">
+              <a:rPr lang="en-US" sz="1050" dirty="0">
                 <a:solidFill>
                   <a:srgbClr val="6A9955"/>
                 </a:solidFill>
@@ -19964,7 +19965,7 @@
               <a:t># Save original to Disk</a:t>
             </a:r>
             <a:br>
-              <a:rPr lang="en-US" sz="1000" b="0" dirty="0">
+              <a:rPr lang="en-US" sz="1050" b="0" dirty="0">
                 <a:solidFill>
                   <a:srgbClr val="CCCCCC"/>
                 </a:solidFill>
@@ -19973,7 +19974,7 @@
               </a:rPr>
             </a:br>
             <a:r>
-              <a:rPr lang="en-US" sz="1000" b="0" dirty="0" err="1">
+              <a:rPr lang="en-US" sz="1050" b="0" dirty="0" err="1">
                 <a:solidFill>
                   <a:srgbClr val="9CDCFE"/>
                 </a:solidFill>
@@ -19983,7 +19984,7 @@
               <a:t>df_en</a:t>
             </a:r>
             <a:r>
-              <a:rPr lang="en-US" sz="1000" b="0" dirty="0" err="1">
+              <a:rPr lang="en-US" sz="1050" b="0" dirty="0" err="1">
                 <a:solidFill>
                   <a:srgbClr val="CCCCCC"/>
                 </a:solidFill>
@@ -19993,7 +19994,7 @@
               <a:t>.</a:t>
             </a:r>
             <a:r>
-              <a:rPr lang="en-US" sz="1000" b="0" dirty="0" err="1">
+              <a:rPr lang="en-US" sz="1050" b="0" dirty="0" err="1">
                 <a:solidFill>
                   <a:srgbClr val="DCDCAA"/>
                 </a:solidFill>
@@ -20003,7 +20004,7 @@
               <a:t>to_csv</a:t>
             </a:r>
             <a:r>
-              <a:rPr lang="en-US" sz="1000" b="0" dirty="0">
+              <a:rPr lang="en-US" sz="1050" b="0" dirty="0">
                 <a:solidFill>
                   <a:srgbClr val="CCCCCC"/>
                 </a:solidFill>
@@ -20013,7 +20014,7 @@
               <a:t>(</a:t>
             </a:r>
             <a:r>
-              <a:rPr lang="en-US" sz="1000" b="0" dirty="0">
+              <a:rPr lang="en-US" sz="1050" b="0" dirty="0">
                 <a:solidFill>
                   <a:srgbClr val="CE9178"/>
                 </a:solidFill>
@@ -20023,7 +20024,7 @@
               <a:t>'./data/</a:t>
             </a:r>
             <a:r>
-              <a:rPr lang="en-US" sz="1000" b="0" dirty="0" err="1">
+              <a:rPr lang="en-US" sz="1050" b="0" dirty="0" err="1">
                 <a:solidFill>
                   <a:srgbClr val="CE9178"/>
                 </a:solidFill>
@@ -20033,7 +20034,7 @@
               <a:t>pd_en.csv</a:t>
             </a:r>
             <a:r>
-              <a:rPr lang="en-US" sz="1000" b="0" dirty="0">
+              <a:rPr lang="en-US" sz="1050" b="0" dirty="0">
                 <a:solidFill>
                   <a:srgbClr val="CE9178"/>
                 </a:solidFill>
@@ -20043,7 +20044,7 @@
               <a:t>'</a:t>
             </a:r>
             <a:r>
-              <a:rPr lang="en-US" sz="1000" b="0" dirty="0">
+              <a:rPr lang="en-US" sz="1050" b="0" dirty="0">
                 <a:solidFill>
                   <a:srgbClr val="CCCCCC"/>
                 </a:solidFill>
@@ -20053,7 +20054,7 @@
               <a:t>, </a:t>
             </a:r>
             <a:r>
-              <a:rPr lang="en-US" sz="1000" b="0" dirty="0">
+              <a:rPr lang="en-US" sz="1050" b="0" dirty="0">
                 <a:solidFill>
                   <a:srgbClr val="9CDCFE"/>
                 </a:solidFill>
@@ -20063,7 +20064,7 @@
               <a:t>index</a:t>
             </a:r>
             <a:r>
-              <a:rPr lang="en-US" sz="1000" b="0" dirty="0">
+              <a:rPr lang="en-US" sz="1050" b="0" dirty="0">
                 <a:solidFill>
                   <a:srgbClr val="D4D4D4"/>
                 </a:solidFill>
@@ -20073,7 +20074,7 @@
               <a:t>=</a:t>
             </a:r>
             <a:r>
-              <a:rPr lang="en-US" sz="1000" b="0" dirty="0">
+              <a:rPr lang="en-US" sz="1050" b="0" dirty="0">
                 <a:solidFill>
                   <a:srgbClr val="569CD6"/>
                 </a:solidFill>
@@ -20083,7 +20084,7 @@
               <a:t>False</a:t>
             </a:r>
             <a:r>
-              <a:rPr lang="en-US" sz="1000" b="0" dirty="0">
+              <a:rPr lang="en-US" sz="1050" b="0" dirty="0">
                 <a:solidFill>
                   <a:srgbClr val="CCCCCC"/>
                 </a:solidFill>
@@ -20095,7 +20096,7 @@
           </a:p>
           <a:p>
             <a:br>
-              <a:rPr lang="en-US" sz="1000" b="0" dirty="0">
+              <a:rPr lang="en-US" sz="1050" b="0" dirty="0">
                 <a:solidFill>
                   <a:srgbClr val="CCCCCC"/>
                 </a:solidFill>
@@ -20104,7 +20105,7 @@
               </a:rPr>
             </a:br>
             <a:br>
-              <a:rPr lang="en-US" sz="1000" b="0" dirty="0">
+              <a:rPr lang="en-US" sz="1050" b="0" dirty="0">
                 <a:solidFill>
                   <a:srgbClr val="CCCCCC"/>
                 </a:solidFill>
@@ -20113,7 +20114,7 @@
               </a:rPr>
             </a:br>
             <a:r>
-              <a:rPr lang="en-US" sz="1000" b="0" dirty="0">
+              <a:rPr lang="en-US" sz="1050" b="0" dirty="0">
                 <a:solidFill>
                   <a:srgbClr val="6A9955"/>
                 </a:solidFill>
@@ -20125,7 +20126,7 @@
           </a:p>
           <a:p>
             <a:r>
-              <a:rPr lang="en-US" sz="1000" dirty="0">
+              <a:rPr lang="en-US" sz="1050" dirty="0">
                 <a:solidFill>
                   <a:srgbClr val="6A9955"/>
                 </a:solidFill>
@@ -20134,7 +20135,7 @@
               <a:t># </a:t>
             </a:r>
             <a:r>
-              <a:rPr lang="en-US" sz="1000" b="0" dirty="0">
+              <a:rPr lang="en-US" sz="1050" b="0" dirty="0">
                 <a:solidFill>
                   <a:srgbClr val="6A9955"/>
                 </a:solidFill>
@@ -20144,7 +20145,7 @@
               <a:t>Iterate over the rows with </a:t>
             </a:r>
             <a:r>
-              <a:rPr lang="en-US" sz="1000" b="0" dirty="0" err="1">
+              <a:rPr lang="en-US" sz="1050" b="0" dirty="0" err="1">
                 <a:solidFill>
                   <a:srgbClr val="6A9955"/>
                 </a:solidFill>
@@ -20154,7 +20155,7 @@
               <a:t>tqdm</a:t>
             </a:r>
             <a:r>
-              <a:rPr lang="en-US" sz="1000" b="0" dirty="0">
+              <a:rPr lang="en-US" sz="1050" b="0" dirty="0">
                 <a:solidFill>
                   <a:srgbClr val="6A9955"/>
                 </a:solidFill>
@@ -20163,7 +20164,7 @@
               </a:rPr>
               <a:t> to show the progress</a:t>
             </a:r>
-            <a:endParaRPr lang="en-US" sz="1000" b="0" dirty="0">
+            <a:endParaRPr lang="en-US" sz="1050" b="0" dirty="0">
               <a:solidFill>
                 <a:srgbClr val="CCCCCC"/>
               </a:solidFill>
@@ -20173,7 +20174,7 @@
           </a:p>
           <a:p>
             <a:r>
-              <a:rPr lang="en-US" sz="1000" b="0" dirty="0">
+              <a:rPr lang="en-US" sz="1050" b="0" dirty="0">
                 <a:solidFill>
                   <a:srgbClr val="C586C0"/>
                 </a:solidFill>
@@ -20183,7 +20184,7 @@
               <a:t>for</a:t>
             </a:r>
             <a:r>
-              <a:rPr lang="en-US" sz="1000" b="0" dirty="0">
+              <a:rPr lang="en-US" sz="1050" b="0" dirty="0">
                 <a:solidFill>
                   <a:srgbClr val="CCCCCC"/>
                 </a:solidFill>
@@ -20193,7 +20194,7 @@
               <a:t> </a:t>
             </a:r>
             <a:r>
-              <a:rPr lang="en-US" sz="1000" b="0" dirty="0">
+              <a:rPr lang="en-US" sz="1050" b="0" dirty="0">
                 <a:solidFill>
                   <a:srgbClr val="9CDCFE"/>
                 </a:solidFill>
@@ -20203,7 +20204,7 @@
               <a:t>index</a:t>
             </a:r>
             <a:r>
-              <a:rPr lang="en-US" sz="1000" b="0" dirty="0">
+              <a:rPr lang="en-US" sz="1050" b="0" dirty="0">
                 <a:solidFill>
                   <a:srgbClr val="CCCCCC"/>
                 </a:solidFill>
@@ -20213,7 +20214,7 @@
               <a:t>, </a:t>
             </a:r>
             <a:r>
-              <a:rPr lang="en-US" sz="1000" b="0" dirty="0">
+              <a:rPr lang="en-US" sz="1050" b="0" dirty="0">
                 <a:solidFill>
                   <a:srgbClr val="9CDCFE"/>
                 </a:solidFill>
@@ -20223,7 +20224,7 @@
               <a:t>row</a:t>
             </a:r>
             <a:r>
-              <a:rPr lang="en-US" sz="1000" b="0" dirty="0">
+              <a:rPr lang="en-US" sz="1050" b="0" dirty="0">
                 <a:solidFill>
                   <a:srgbClr val="CCCCCC"/>
                 </a:solidFill>
@@ -20233,7 +20234,7 @@
               <a:t> </a:t>
             </a:r>
             <a:r>
-              <a:rPr lang="en-US" sz="1000" b="0" dirty="0">
+              <a:rPr lang="en-US" sz="1050" b="0" dirty="0">
                 <a:solidFill>
                   <a:srgbClr val="C586C0"/>
                 </a:solidFill>
@@ -20243,7 +20244,7 @@
               <a:t>in</a:t>
             </a:r>
             <a:r>
-              <a:rPr lang="en-US" sz="1000" b="0" dirty="0">
+              <a:rPr lang="en-US" sz="1050" b="0" dirty="0">
                 <a:solidFill>
                   <a:srgbClr val="CCCCCC"/>
                 </a:solidFill>
@@ -20253,7 +20254,7 @@
               <a:t> </a:t>
             </a:r>
             <a:r>
-              <a:rPr lang="en-US" sz="1000" b="0" dirty="0" err="1">
+              <a:rPr lang="en-US" sz="1050" b="0" dirty="0" err="1">
                 <a:solidFill>
                   <a:srgbClr val="4EC9B0"/>
                 </a:solidFill>
@@ -20263,7 +20264,7 @@
               <a:t>tqdm</a:t>
             </a:r>
             <a:r>
-              <a:rPr lang="en-US" sz="1000" b="0" dirty="0">
+              <a:rPr lang="en-US" sz="1050" b="0" dirty="0">
                 <a:solidFill>
                   <a:srgbClr val="CCCCCC"/>
                 </a:solidFill>
@@ -20273,7 +20274,7 @@
               <a:t>(</a:t>
             </a:r>
             <a:r>
-              <a:rPr lang="en-US" sz="1000" b="0" dirty="0" err="1">
+              <a:rPr lang="en-US" sz="1050" b="0" dirty="0" err="1">
                 <a:solidFill>
                   <a:srgbClr val="9CDCFE"/>
                 </a:solidFill>
@@ -20283,7 +20284,7 @@
               <a:t>df_en</a:t>
             </a:r>
             <a:r>
-              <a:rPr lang="en-US" sz="1000" b="0" dirty="0" err="1">
+              <a:rPr lang="en-US" sz="1050" b="0" dirty="0" err="1">
                 <a:solidFill>
                   <a:srgbClr val="CCCCCC"/>
                 </a:solidFill>
@@ -20293,7 +20294,7 @@
               <a:t>.</a:t>
             </a:r>
             <a:r>
-              <a:rPr lang="en-US" sz="1000" b="0" dirty="0" err="1">
+              <a:rPr lang="en-US" sz="1050" b="0" dirty="0" err="1">
                 <a:solidFill>
                   <a:srgbClr val="DCDCAA"/>
                 </a:solidFill>
@@ -20303,7 +20304,7 @@
               <a:t>iterrows</a:t>
             </a:r>
             <a:r>
-              <a:rPr lang="en-US" sz="1000" b="0" dirty="0">
+              <a:rPr lang="en-US" sz="1050" b="0" dirty="0">
                 <a:solidFill>
                   <a:srgbClr val="CCCCCC"/>
                 </a:solidFill>
@@ -20313,7 +20314,7 @@
               <a:t>(), </a:t>
             </a:r>
             <a:r>
-              <a:rPr lang="en-US" sz="1000" b="0" dirty="0">
+              <a:rPr lang="en-US" sz="1050" b="0" dirty="0">
                 <a:solidFill>
                   <a:srgbClr val="9CDCFE"/>
                 </a:solidFill>
@@ -20323,7 +20324,7 @@
               <a:t>total</a:t>
             </a:r>
             <a:r>
-              <a:rPr lang="en-US" sz="1000" b="0" dirty="0">
+              <a:rPr lang="en-US" sz="1050" b="0" dirty="0">
                 <a:solidFill>
                   <a:srgbClr val="D4D4D4"/>
                 </a:solidFill>
@@ -20333,7 +20334,7 @@
               <a:t>=</a:t>
             </a:r>
             <a:r>
-              <a:rPr lang="en-US" sz="1000" b="0" dirty="0" err="1">
+              <a:rPr lang="en-US" sz="1050" b="0" dirty="0" err="1">
                 <a:solidFill>
                   <a:srgbClr val="9CDCFE"/>
                 </a:solidFill>
@@ -20343,7 +20344,7 @@
               <a:t>df_en</a:t>
             </a:r>
             <a:r>
-              <a:rPr lang="en-US" sz="1000" b="0" dirty="0" err="1">
+              <a:rPr lang="en-US" sz="1050" b="0" dirty="0" err="1">
                 <a:solidFill>
                   <a:srgbClr val="CCCCCC"/>
                 </a:solidFill>
@@ -20353,7 +20354,7 @@
               <a:t>.</a:t>
             </a:r>
             <a:r>
-              <a:rPr lang="en-US" sz="1000" b="0" dirty="0" err="1">
+              <a:rPr lang="en-US" sz="1050" b="0" dirty="0" err="1">
                 <a:solidFill>
                   <a:srgbClr val="9CDCFE"/>
                 </a:solidFill>
@@ -20363,7 +20364,7 @@
               <a:t>shape</a:t>
             </a:r>
             <a:r>
-              <a:rPr lang="en-US" sz="1000" b="0" dirty="0">
+              <a:rPr lang="en-US" sz="1050" b="0" dirty="0">
                 <a:solidFill>
                   <a:srgbClr val="CCCCCC"/>
                 </a:solidFill>
@@ -20373,7 +20374,7 @@
               <a:t>[</a:t>
             </a:r>
             <a:r>
-              <a:rPr lang="en-US" sz="1000" b="0" dirty="0">
+              <a:rPr lang="en-US" sz="1050" b="0" dirty="0">
                 <a:solidFill>
                   <a:srgbClr val="B5CEA8"/>
                 </a:solidFill>
@@ -20383,7 +20384,7 @@
               <a:t>0</a:t>
             </a:r>
             <a:r>
-              <a:rPr lang="en-US" sz="1000" b="0" dirty="0">
+              <a:rPr lang="en-US" sz="1050" b="0" dirty="0">
                 <a:solidFill>
                   <a:srgbClr val="CCCCCC"/>
                 </a:solidFill>
@@ -20392,7 +20393,7 @@
               </a:rPr>
               <a:t>]):</a:t>
             </a:r>
-            <a:endParaRPr lang="en-US" sz="1000" b="0" dirty="0">
+            <a:endParaRPr lang="en-US" sz="1050" b="0" dirty="0">
               <a:solidFill>
                 <a:srgbClr val="6A9955"/>
               </a:solidFill>
@@ -20402,7 +20403,7 @@
           </a:p>
           <a:p>
             <a:r>
-              <a:rPr lang="en-US" sz="1000" dirty="0">
+              <a:rPr lang="en-US" sz="1050" dirty="0">
                 <a:solidFill>
                   <a:srgbClr val="6A9955"/>
                 </a:solidFill>
@@ -20411,7 +20412,7 @@
               <a:t>    </a:t>
             </a:r>
             <a:r>
-              <a:rPr lang="en-US" sz="1000" b="0" dirty="0">
+              <a:rPr lang="en-US" sz="1050" b="0" dirty="0">
                 <a:solidFill>
                   <a:srgbClr val="6A9955"/>
                 </a:solidFill>
@@ -20423,7 +20424,7 @@
           </a:p>
           <a:p>
             <a:r>
-              <a:rPr lang="en-US" sz="1000" dirty="0">
+              <a:rPr lang="en-US" sz="1050" dirty="0">
                 <a:solidFill>
                   <a:srgbClr val="6A9955"/>
                 </a:solidFill>
@@ -20432,7 +20433,7 @@
               <a:t>    # </a:t>
             </a:r>
             <a:r>
-              <a:rPr lang="en-US" sz="1000" b="0" dirty="0">
+              <a:rPr lang="en-US" sz="1050" b="0" dirty="0">
                 <a:solidFill>
                   <a:srgbClr val="6A9955"/>
                 </a:solidFill>
@@ -20441,7 +20442,7 @@
               </a:rPr>
               <a:t>Call Translation</a:t>
             </a:r>
-            <a:endParaRPr lang="en-US" sz="1000" b="0" dirty="0">
+            <a:endParaRPr lang="en-US" sz="1050" b="0" dirty="0">
               <a:solidFill>
                 <a:srgbClr val="CCCCCC"/>
               </a:solidFill>
@@ -20451,7 +20452,7 @@
           </a:p>
           <a:p>
             <a:r>
-              <a:rPr lang="en-US" sz="1000" b="0" dirty="0">
+              <a:rPr lang="en-US" sz="1050" b="0" dirty="0">
                 <a:solidFill>
                   <a:srgbClr val="9CDCFE"/>
                 </a:solidFill>
@@ -20461,7 +20462,7 @@
               <a:t>    sentence</a:t>
             </a:r>
             <a:r>
-              <a:rPr lang="en-US" sz="1000" b="0" dirty="0">
+              <a:rPr lang="en-US" sz="1050" b="0" dirty="0">
                 <a:solidFill>
                   <a:srgbClr val="CCCCCC"/>
                 </a:solidFill>
@@ -20471,7 +20472,7 @@
               <a:t> </a:t>
             </a:r>
             <a:r>
-              <a:rPr lang="en-US" sz="1000" b="0" dirty="0">
+              <a:rPr lang="en-US" sz="1050" b="0" dirty="0">
                 <a:solidFill>
                   <a:srgbClr val="D4D4D4"/>
                 </a:solidFill>
@@ -20481,7 +20482,7 @@
               <a:t>=</a:t>
             </a:r>
             <a:r>
-              <a:rPr lang="en-US" sz="1000" b="0" dirty="0">
+              <a:rPr lang="en-US" sz="1050" b="0" dirty="0">
                 <a:solidFill>
                   <a:srgbClr val="CCCCCC"/>
                 </a:solidFill>
@@ -20491,7 +20492,7 @@
               <a:t> </a:t>
             </a:r>
             <a:r>
-              <a:rPr lang="en-US" sz="1000" b="0" dirty="0">
+              <a:rPr lang="en-US" sz="1050" b="0" dirty="0">
                 <a:solidFill>
                   <a:srgbClr val="DCDCAA"/>
                 </a:solidFill>
@@ -20501,7 +20502,7 @@
               <a:t>translate</a:t>
             </a:r>
             <a:r>
-              <a:rPr lang="en-US" sz="1000" b="0" dirty="0">
+              <a:rPr lang="en-US" sz="1050" b="0" dirty="0">
                 <a:solidFill>
                   <a:srgbClr val="CCCCCC"/>
                 </a:solidFill>
@@ -20511,7 +20512,7 @@
               <a:t>(</a:t>
             </a:r>
             <a:r>
-              <a:rPr lang="en-US" sz="1000" b="0" dirty="0">
+              <a:rPr lang="en-US" sz="1050" b="0" dirty="0">
                 <a:solidFill>
                   <a:srgbClr val="9CDCFE"/>
                 </a:solidFill>
@@ -20521,7 +20522,7 @@
               <a:t>row</a:t>
             </a:r>
             <a:r>
-              <a:rPr lang="en-US" sz="1000" b="0" dirty="0">
+              <a:rPr lang="en-US" sz="1050" b="0" dirty="0">
                 <a:solidFill>
                   <a:srgbClr val="CCCCCC"/>
                 </a:solidFill>
@@ -20531,7 +20532,7 @@
               <a:t>[</a:t>
             </a:r>
             <a:r>
-              <a:rPr lang="en-US" sz="1000" b="0" dirty="0">
+              <a:rPr lang="en-US" sz="1050" b="0" dirty="0">
                 <a:solidFill>
                   <a:srgbClr val="CE9178"/>
                 </a:solidFill>
@@ -20541,7 +20542,7 @@
               <a:t>"</a:t>
             </a:r>
             <a:r>
-              <a:rPr lang="en-US" sz="1000" b="0" dirty="0" err="1">
+              <a:rPr lang="en-US" sz="1050" b="0" dirty="0" err="1">
                 <a:solidFill>
                   <a:srgbClr val="CE9178"/>
                 </a:solidFill>
@@ -20551,7 +20552,7 @@
               <a:t>sentence_en</a:t>
             </a:r>
             <a:r>
-              <a:rPr lang="en-US" sz="1000" b="0" dirty="0">
+              <a:rPr lang="en-US" sz="1050" b="0" dirty="0">
                 <a:solidFill>
                   <a:srgbClr val="CE9178"/>
                 </a:solidFill>
@@ -20561,7 +20562,7 @@
               <a:t>"</a:t>
             </a:r>
             <a:r>
-              <a:rPr lang="en-US" sz="1000" b="0" dirty="0">
+              <a:rPr lang="en-US" sz="1050" b="0" dirty="0">
                 <a:solidFill>
                   <a:srgbClr val="CCCCCC"/>
                 </a:solidFill>
@@ -20571,7 +20572,7 @@
               <a:t>], </a:t>
             </a:r>
             <a:r>
-              <a:rPr lang="en-US" sz="1000" b="0" dirty="0">
+              <a:rPr lang="en-US" sz="1050" b="0" dirty="0">
                 <a:solidFill>
                   <a:srgbClr val="CE9178"/>
                 </a:solidFill>
@@ -20581,7 +20582,7 @@
               <a:t>'de’</a:t>
             </a:r>
             <a:r>
-              <a:rPr lang="en-US" sz="1000" b="0" dirty="0">
+              <a:rPr lang="en-US" sz="1050" b="0" dirty="0">
                 <a:solidFill>
                   <a:srgbClr val="CCCCCC"/>
                 </a:solidFill>
@@ -20591,7 +20592,7 @@
               <a:t>)</a:t>
             </a:r>
             <a:r>
-              <a:rPr lang="en-US" sz="1000" dirty="0">
+              <a:rPr lang="en-US" sz="1050" dirty="0">
                 <a:solidFill>
                   <a:srgbClr val="6A9955"/>
                 </a:solidFill>
@@ -20600,7 +20601,7 @@
               <a:t> # </a:t>
             </a:r>
             <a:r>
-              <a:rPr lang="en-US" sz="1000" b="0" dirty="0">
+              <a:rPr lang="en-US" sz="1050" b="0" dirty="0">
                 <a:solidFill>
                   <a:srgbClr val="6A9955"/>
                 </a:solidFill>
@@ -20609,7 +20610,7 @@
               </a:rPr>
               <a:t>To German (‘de’)</a:t>
             </a:r>
-            <a:endParaRPr lang="en-US" sz="1000" b="0" dirty="0">
+            <a:endParaRPr lang="en-US" sz="1050" b="0" dirty="0">
               <a:solidFill>
                 <a:srgbClr val="CCCCCC"/>
               </a:solidFill>
@@ -20618,7 +20619,7 @@
             </a:endParaRPr>
           </a:p>
           <a:p>
-            <a:endParaRPr lang="en-US" sz="1000" b="0" dirty="0">
+            <a:endParaRPr lang="en-US" sz="1050" b="0" dirty="0">
               <a:solidFill>
                 <a:srgbClr val="6A9955"/>
               </a:solidFill>
@@ -20627,7 +20628,7 @@
             </a:endParaRPr>
           </a:p>
           <a:p>
-            <a:endParaRPr lang="en-US" sz="1000" b="0" dirty="0">
+            <a:endParaRPr lang="en-US" sz="1050" b="0" dirty="0">
               <a:solidFill>
                 <a:srgbClr val="6A9955"/>
               </a:solidFill>
@@ -20637,7 +20638,7 @@
           </a:p>
           <a:p>
             <a:r>
-              <a:rPr lang="en-US" sz="1000" b="0" dirty="0">
+              <a:rPr lang="en-US" sz="1050" b="0" dirty="0">
                 <a:solidFill>
                   <a:srgbClr val="6A9955"/>
                 </a:solidFill>
@@ -20649,7 +20650,7 @@
           </a:p>
           <a:p>
             <a:r>
-              <a:rPr lang="en-US" sz="1000" dirty="0">
+              <a:rPr lang="en-US" sz="1050" dirty="0">
                 <a:solidFill>
                   <a:srgbClr val="6A9955"/>
                 </a:solidFill>
@@ -20658,7 +20659,7 @@
               <a:t>    # </a:t>
             </a:r>
             <a:r>
-              <a:rPr lang="en-US" sz="1000" b="0" dirty="0">
+              <a:rPr lang="en-US" sz="1050" b="0" dirty="0">
                 <a:solidFill>
                   <a:srgbClr val="6A9955"/>
                 </a:solidFill>
@@ -20667,7 +20668,7 @@
               </a:rPr>
               <a:t>Save Sentence on Column</a:t>
             </a:r>
-            <a:endParaRPr lang="en-US" sz="1000" b="0" dirty="0">
+            <a:endParaRPr lang="en-US" sz="1050" b="0" dirty="0">
               <a:solidFill>
                 <a:srgbClr val="CCCCCC"/>
               </a:solidFill>
@@ -20677,7 +20678,7 @@
           </a:p>
           <a:p>
             <a:r>
-              <a:rPr lang="en-US" sz="1000" b="0" dirty="0">
+              <a:rPr lang="en-US" sz="1050" b="0" dirty="0">
                 <a:solidFill>
                   <a:srgbClr val="9CDCFE"/>
                 </a:solidFill>
@@ -20687,7 +20688,7 @@
               <a:t>    </a:t>
             </a:r>
             <a:r>
-              <a:rPr lang="en-US" sz="1000" b="0" dirty="0" err="1">
+              <a:rPr lang="en-US" sz="1050" b="0" dirty="0" err="1">
                 <a:solidFill>
                   <a:srgbClr val="9CDCFE"/>
                 </a:solidFill>
@@ -20697,7 +20698,7 @@
               <a:t>df_en</a:t>
             </a:r>
             <a:r>
-              <a:rPr lang="en-US" sz="1000" b="0" dirty="0" err="1">
+              <a:rPr lang="en-US" sz="1050" b="0" dirty="0" err="1">
                 <a:solidFill>
                   <a:srgbClr val="CCCCCC"/>
                 </a:solidFill>
@@ -20707,7 +20708,7 @@
               <a:t>.</a:t>
             </a:r>
             <a:r>
-              <a:rPr lang="en-US" sz="1000" b="0" dirty="0" err="1">
+              <a:rPr lang="en-US" sz="1050" b="0" dirty="0" err="1">
                 <a:solidFill>
                   <a:srgbClr val="9CDCFE"/>
                 </a:solidFill>
@@ -20717,7 +20718,7 @@
               <a:t>at</a:t>
             </a:r>
             <a:r>
-              <a:rPr lang="en-US" sz="1000" b="0" dirty="0">
+              <a:rPr lang="en-US" sz="1050" b="0" dirty="0">
                 <a:solidFill>
                   <a:srgbClr val="CCCCCC"/>
                 </a:solidFill>
@@ -20727,7 +20728,7 @@
               <a:t>[</a:t>
             </a:r>
             <a:r>
-              <a:rPr lang="en-US" sz="1000" b="0" dirty="0">
+              <a:rPr lang="en-US" sz="1050" b="0" dirty="0">
                 <a:solidFill>
                   <a:srgbClr val="9CDCFE"/>
                 </a:solidFill>
@@ -20737,7 +20738,7 @@
               <a:t>index</a:t>
             </a:r>
             <a:r>
-              <a:rPr lang="en-US" sz="1000" b="0" dirty="0">
+              <a:rPr lang="en-US" sz="1050" b="0" dirty="0">
                 <a:solidFill>
                   <a:srgbClr val="CCCCCC"/>
                 </a:solidFill>
@@ -20747,7 +20748,7 @@
               <a:t>, </a:t>
             </a:r>
             <a:r>
-              <a:rPr lang="en-US" sz="1000" b="0" dirty="0">
+              <a:rPr lang="en-US" sz="1050" b="0" dirty="0">
                 <a:solidFill>
                   <a:srgbClr val="CE9178"/>
                 </a:solidFill>
@@ -20757,7 +20758,7 @@
               <a:t>'</a:t>
             </a:r>
             <a:r>
-              <a:rPr lang="en-US" sz="1000" b="0" dirty="0" err="1">
+              <a:rPr lang="en-US" sz="1050" b="0" dirty="0" err="1">
                 <a:solidFill>
                   <a:srgbClr val="CE9178"/>
                 </a:solidFill>
@@ -20767,7 +20768,7 @@
               <a:t>sentence_de</a:t>
             </a:r>
             <a:r>
-              <a:rPr lang="en-US" sz="1000" b="0" dirty="0">
+              <a:rPr lang="en-US" sz="1050" b="0" dirty="0">
                 <a:solidFill>
                   <a:srgbClr val="CE9178"/>
                 </a:solidFill>
@@ -20777,7 +20778,7 @@
               <a:t>'</a:t>
             </a:r>
             <a:r>
-              <a:rPr lang="en-US" sz="1000" b="0" dirty="0">
+              <a:rPr lang="en-US" sz="1050" b="0" dirty="0">
                 <a:solidFill>
                   <a:srgbClr val="CCCCCC"/>
                 </a:solidFill>
@@ -20787,7 +20788,7 @@
               <a:t>] </a:t>
             </a:r>
             <a:r>
-              <a:rPr lang="en-US" sz="1000" b="0" dirty="0">
+              <a:rPr lang="en-US" sz="1050" b="0" dirty="0">
                 <a:solidFill>
                   <a:srgbClr val="D4D4D4"/>
                 </a:solidFill>
@@ -20797,7 +20798,7 @@
               <a:t>=</a:t>
             </a:r>
             <a:r>
-              <a:rPr lang="en-US" sz="1000" b="0" dirty="0">
+              <a:rPr lang="en-US" sz="1050" b="0" dirty="0">
                 <a:solidFill>
                   <a:srgbClr val="CCCCCC"/>
                 </a:solidFill>
@@ -20807,7 +20808,7 @@
               <a:t> </a:t>
             </a:r>
             <a:r>
-              <a:rPr lang="en-US" sz="1000" b="0" dirty="0">
+              <a:rPr lang="en-US" sz="1050" b="0" dirty="0">
                 <a:solidFill>
                   <a:srgbClr val="9CDCFE"/>
                 </a:solidFill>
@@ -20816,7 +20817,7 @@
               </a:rPr>
               <a:t>sentence</a:t>
             </a:r>
-            <a:endParaRPr lang="en-US" sz="1000" b="0" dirty="0">
+            <a:endParaRPr lang="en-US" sz="1050" b="0" dirty="0">
               <a:solidFill>
                 <a:srgbClr val="CCCCCC"/>
               </a:solidFill>
@@ -20826,7 +20827,7 @@
           </a:p>
           <a:p>
             <a:br>
-              <a:rPr lang="en-US" sz="1000" b="0" dirty="0">
+              <a:rPr lang="en-US" sz="1050" b="0" dirty="0">
                 <a:solidFill>
                   <a:srgbClr val="CCCCCC"/>
                 </a:solidFill>
@@ -20835,7 +20836,7 @@
               </a:rPr>
             </a:br>
             <a:r>
-              <a:rPr lang="en-US" sz="1000" b="0" dirty="0">
+              <a:rPr lang="en-US" sz="1050" b="0" dirty="0">
                 <a:solidFill>
                   <a:srgbClr val="6A9955"/>
                 </a:solidFill>
@@ -20847,7 +20848,7 @@
           </a:p>
           <a:p>
             <a:r>
-              <a:rPr lang="en-US" sz="1000" dirty="0">
+              <a:rPr lang="en-US" sz="1050" dirty="0">
                 <a:solidFill>
                   <a:srgbClr val="6A9955"/>
                 </a:solidFill>
@@ -20856,7 +20857,7 @@
               <a:t>#</a:t>
             </a:r>
             <a:r>
-              <a:rPr lang="en-US" sz="1000" b="0" dirty="0">
+              <a:rPr lang="en-US" sz="1050" b="0" dirty="0">
                 <a:solidFill>
                   <a:srgbClr val="6A9955"/>
                 </a:solidFill>
@@ -20865,7 +20866,7 @@
               </a:rPr>
               <a:t>Save the file with all the translations!</a:t>
             </a:r>
-            <a:endParaRPr lang="en-US" sz="1000" b="0" dirty="0">
+            <a:endParaRPr lang="en-US" sz="1050" b="0" dirty="0">
               <a:solidFill>
                 <a:srgbClr val="CCCCCC"/>
               </a:solidFill>
@@ -20875,7 +20876,7 @@
           </a:p>
           <a:p>
             <a:r>
-              <a:rPr lang="en-US" sz="1000" b="0" dirty="0" err="1">
+              <a:rPr lang="en-US" sz="1050" b="0" dirty="0" err="1">
                 <a:solidFill>
                   <a:srgbClr val="9CDCFE"/>
                 </a:solidFill>
@@ -20885,7 +20886,7 @@
               <a:t>df_en</a:t>
             </a:r>
             <a:r>
-              <a:rPr lang="en-US" sz="1000" b="0" dirty="0" err="1">
+              <a:rPr lang="en-US" sz="1050" b="0" dirty="0" err="1">
                 <a:solidFill>
                   <a:srgbClr val="CCCCCC"/>
                 </a:solidFill>
@@ -20895,7 +20896,7 @@
               <a:t>.</a:t>
             </a:r>
             <a:r>
-              <a:rPr lang="en-US" sz="1000" b="0" dirty="0" err="1">
+              <a:rPr lang="en-US" sz="1050" b="0" dirty="0" err="1">
                 <a:solidFill>
                   <a:srgbClr val="DCDCAA"/>
                 </a:solidFill>
@@ -20905,7 +20906,7 @@
               <a:t>to_csv</a:t>
             </a:r>
             <a:r>
-              <a:rPr lang="en-US" sz="1000" b="0" dirty="0">
+              <a:rPr lang="en-US" sz="1050" b="0" dirty="0">
                 <a:solidFill>
                   <a:srgbClr val="CCCCCC"/>
                 </a:solidFill>
@@ -20915,7 +20916,7 @@
               <a:t>(</a:t>
             </a:r>
             <a:r>
-              <a:rPr lang="en-US" sz="1000" b="0" dirty="0">
+              <a:rPr lang="en-US" sz="1050" b="0" dirty="0">
                 <a:solidFill>
                   <a:srgbClr val="CE9178"/>
                 </a:solidFill>
@@ -20925,7 +20926,7 @@
               <a:t>'./data/</a:t>
             </a:r>
             <a:r>
-              <a:rPr lang="en-US" sz="1000" b="0" dirty="0" err="1">
+              <a:rPr lang="en-US" sz="1050" b="0" dirty="0" err="1">
                 <a:solidFill>
                   <a:srgbClr val="CE9178"/>
                 </a:solidFill>
@@ -20935,7 +20936,7 @@
               <a:t>pd_en_translated.csv</a:t>
             </a:r>
             <a:r>
-              <a:rPr lang="en-US" sz="1000" b="0" dirty="0">
+              <a:rPr lang="en-US" sz="1050" b="0" dirty="0">
                 <a:solidFill>
                   <a:srgbClr val="CE9178"/>
                 </a:solidFill>
@@ -20945,7 +20946,7 @@
               <a:t>'</a:t>
             </a:r>
             <a:r>
-              <a:rPr lang="en-US" sz="1000" b="0" dirty="0">
+              <a:rPr lang="en-US" sz="1050" b="0" dirty="0">
                 <a:solidFill>
                   <a:srgbClr val="CCCCCC"/>
                 </a:solidFill>
@@ -20955,7 +20956,7 @@
               <a:t>, </a:t>
             </a:r>
             <a:r>
-              <a:rPr lang="en-US" sz="1000" b="0" dirty="0">
+              <a:rPr lang="en-US" sz="1050" b="0" dirty="0">
                 <a:solidFill>
                   <a:srgbClr val="9CDCFE"/>
                 </a:solidFill>
@@ -20965,7 +20966,7 @@
               <a:t>index</a:t>
             </a:r>
             <a:r>
-              <a:rPr lang="en-US" sz="1000" b="0" dirty="0">
+              <a:rPr lang="en-US" sz="1050" b="0" dirty="0">
                 <a:solidFill>
                   <a:srgbClr val="D4D4D4"/>
                 </a:solidFill>
@@ -20975,7 +20976,7 @@
               <a:t>=</a:t>
             </a:r>
             <a:r>
-              <a:rPr lang="en-US" sz="1000" b="0" dirty="0">
+              <a:rPr lang="en-US" sz="1050" b="0" dirty="0">
                 <a:solidFill>
                   <a:srgbClr val="569CD6"/>
                 </a:solidFill>
@@ -20985,7 +20986,7 @@
               <a:t>False</a:t>
             </a:r>
             <a:r>
-              <a:rPr lang="en-US" sz="1000" b="0" dirty="0">
+              <a:rPr lang="en-US" sz="1050" b="0" dirty="0">
                 <a:solidFill>
                   <a:srgbClr val="CCCCCC"/>
                 </a:solidFill>
@@ -22820,17 +22821,21 @@
           <a:p>
             <a:r>
               <a:rPr lang="en-US" dirty="0"/>
-              <a:t>Due to the eight (8) emotions present our model classification we decided to build of type </a:t>
+              <a:t>Due to the eight (8) emotions present our research we decided to build of type </a:t>
             </a:r>
             <a:r>
               <a:rPr lang="en-US" b="1" dirty="0"/>
-              <a:t>Multi-Class</a:t>
+              <a:t>Multi-Class Classification Model</a:t>
             </a:r>
           </a:p>
           <a:p>
             <a:r>
               <a:rPr lang="en-US" b="1" dirty="0"/>
-              <a:t>This is due to the research scope to be in search of predictive improvement and measuring a single class of emotion is more distinct than using Multi-Label</a:t>
+              <a:t>This is due to the research scope to be in search of predictive improvement and measuring a single class of emotion is more distinct than using Multi-Label </a:t>
+            </a:r>
+            <a:r>
+              <a:rPr lang="en-US" b="1" dirty="0" err="1"/>
+              <a:t>Classificaiton</a:t>
             </a:r>
             <a:endParaRPr lang="en-US" dirty="0"/>
           </a:p>
@@ -23032,7 +23037,7 @@
         </p:spPr>
         <p:txBody>
           <a:bodyPr>
-            <a:normAutofit/>
+            <a:normAutofit fontScale="92500"/>
           </a:bodyPr>
           <a:lstStyle/>
           <a:p>
@@ -23061,7 +23066,7 @@
           <a:p>
             <a:r>
               <a:rPr lang="en-US" dirty="0"/>
-              <a:t>We used </a:t>
+              <a:t>We used the </a:t>
             </a:r>
             <a:r>
               <a:rPr lang="en-US" dirty="0" err="1"/>
@@ -23083,7 +23088,7 @@
           <a:p>
             <a:r>
               <a:rPr lang="en-US" dirty="0"/>
-              <a:t>We opted to not use case sensitive tokenization due to the nature of tweets generally not following capitalizations.</a:t>
+              <a:t>We opted to not use case sensitive tokenization due to the nature of tweets generally not following capitalizations and us mixing English with German.</a:t>
             </a:r>
           </a:p>
         </p:txBody>
@@ -24197,7 +24202,7 @@
         </p:spPr>
         <p:txBody>
           <a:bodyPr>
-            <a:normAutofit fontScale="92500" lnSpcReduction="20000"/>
+            <a:normAutofit fontScale="85000" lnSpcReduction="10000"/>
           </a:bodyPr>
           <a:lstStyle/>
           <a:p>
@@ -24222,7 +24227,7 @@
             </a:br>
             <a:r>
               <a:rPr lang="en-US" dirty="0"/>
-              <a:t>It uses a logistic function to model the dependent variable.</a:t>
+              <a:t>It uses a logistic function to model the dependent variable. Standard approach but not optimal for Multi-Class approach.</a:t>
             </a:r>
           </a:p>
           <a:p>
@@ -24908,6 +24913,36 @@
           </a:sp3d>
         </p:spPr>
       </p:pic>
+      <p:pic>
+        <p:nvPicPr>
+          <p:cNvPr id="5" name="Picture 4" descr="A computer with a hexagon and a blue screen&#10;&#10;Description automatically generated">
+            <a:extLst>
+              <a:ext uri="{FF2B5EF4-FFF2-40B4-BE49-F238E27FC236}">
+                <a16:creationId xmlns:a16="http://schemas.microsoft.com/office/drawing/2014/main" id="{A22B9B19-7390-5DE4-3C03-8B553DDB3CF6}"/>
+              </a:ext>
+            </a:extLst>
+          </p:cNvPr>
+          <p:cNvPicPr>
+            <a:picLocks noChangeAspect="1"/>
+          </p:cNvPicPr>
+          <p:nvPr/>
+        </p:nvPicPr>
+        <p:blipFill>
+          <a:blip r:embed="rId3"/>
+          <a:stretch>
+            <a:fillRect/>
+          </a:stretch>
+        </p:blipFill>
+        <p:spPr>
+          <a:xfrm>
+            <a:off x="10866026" y="1177625"/>
+            <a:ext cx="957576" cy="957576"/>
+          </a:xfrm>
+          <a:prstGeom prst="rect">
+            <a:avLst/>
+          </a:prstGeom>
+        </p:spPr>
+      </p:pic>
     </p:spTree>
     <p:extLst>
       <p:ext uri="{BB962C8B-B14F-4D97-AF65-F5344CB8AC3E}">
@@ -24922,6 +24957,278 @@
 </file>
 
 <file path=ppt/slides/slide19.xml><?xml version="1.0" encoding="utf-8"?>
+<p:sld xmlns:a="http://schemas.openxmlformats.org/drawingml/2006/main" xmlns:r="http://schemas.openxmlformats.org/officeDocument/2006/relationships" xmlns:p="http://schemas.openxmlformats.org/presentationml/2006/main">
+  <p:cSld>
+    <p:spTree>
+      <p:nvGrpSpPr>
+        <p:cNvPr id="1" name=""/>
+        <p:cNvGrpSpPr/>
+        <p:nvPr/>
+      </p:nvGrpSpPr>
+      <p:grpSpPr>
+        <a:xfrm>
+          <a:off x="0" y="0"/>
+          <a:ext cx="0" cy="0"/>
+          <a:chOff x="0" y="0"/>
+          <a:chExt cx="0" cy="0"/>
+        </a:xfrm>
+      </p:grpSpPr>
+      <p:sp>
+        <p:nvSpPr>
+          <p:cNvPr id="2" name="Title 1">
+            <a:extLst>
+              <a:ext uri="{FF2B5EF4-FFF2-40B4-BE49-F238E27FC236}">
+                <a16:creationId xmlns:a16="http://schemas.microsoft.com/office/drawing/2014/main" id="{FB3E53EF-7364-71AA-48D2-C967AC9C67E0}"/>
+              </a:ext>
+            </a:extLst>
+          </p:cNvPr>
+          <p:cNvSpPr>
+            <a:spLocks noGrp="1"/>
+          </p:cNvSpPr>
+          <p:nvPr>
+            <p:ph type="title"/>
+          </p:nvPr>
+        </p:nvSpPr>
+        <p:spPr/>
+        <p:txBody>
+          <a:bodyPr/>
+          <a:lstStyle/>
+          <a:p>
+            <a:r>
+              <a:rPr lang="en-US" dirty="0"/>
+              <a:t>Demo &amp; Code Review</a:t>
+            </a:r>
+          </a:p>
+        </p:txBody>
+      </p:sp>
+      <p:pic>
+        <p:nvPicPr>
+          <p:cNvPr id="4" name="Picture 3" descr="A computer with a hexagon and a blue screen&#10;&#10;Description automatically generated">
+            <a:extLst>
+              <a:ext uri="{FF2B5EF4-FFF2-40B4-BE49-F238E27FC236}">
+                <a16:creationId xmlns:a16="http://schemas.microsoft.com/office/drawing/2014/main" id="{204CB5F1-73B2-2801-114C-4C4628099BD3}"/>
+              </a:ext>
+            </a:extLst>
+          </p:cNvPr>
+          <p:cNvPicPr>
+            <a:picLocks noChangeAspect="1"/>
+          </p:cNvPicPr>
+          <p:nvPr/>
+        </p:nvPicPr>
+        <p:blipFill>
+          <a:blip r:embed="rId2"/>
+          <a:stretch>
+            <a:fillRect/>
+          </a:stretch>
+        </p:blipFill>
+        <p:spPr>
+          <a:xfrm>
+            <a:off x="4613586" y="1946586"/>
+            <a:ext cx="2964828" cy="2964828"/>
+          </a:xfrm>
+          <a:prstGeom prst="rect">
+            <a:avLst/>
+          </a:prstGeom>
+        </p:spPr>
+      </p:pic>
+    </p:spTree>
+    <p:extLst>
+      <p:ext uri="{BB962C8B-B14F-4D97-AF65-F5344CB8AC3E}">
+        <p14:creationId xmlns:p14="http://schemas.microsoft.com/office/powerpoint/2010/main" val="3578769470"/>
+      </p:ext>
+    </p:extLst>
+  </p:cSld>
+  <p:clrMapOvr>
+    <a:masterClrMapping/>
+  </p:clrMapOvr>
+</p:sld>
+</file>
+
+<file path=ppt/slides/slide2.xml><?xml version="1.0" encoding="utf-8"?>
+<p:sld xmlns:a="http://schemas.openxmlformats.org/drawingml/2006/main" xmlns:r="http://schemas.openxmlformats.org/officeDocument/2006/relationships" xmlns:p="http://schemas.openxmlformats.org/presentationml/2006/main">
+  <p:cSld>
+    <p:spTree>
+      <p:nvGrpSpPr>
+        <p:cNvPr id="1" name=""/>
+        <p:cNvGrpSpPr/>
+        <p:nvPr/>
+      </p:nvGrpSpPr>
+      <p:grpSpPr>
+        <a:xfrm>
+          <a:off x="0" y="0"/>
+          <a:ext cx="0" cy="0"/>
+          <a:chOff x="0" y="0"/>
+          <a:chExt cx="0" cy="0"/>
+        </a:xfrm>
+      </p:grpSpPr>
+      <p:sp>
+        <p:nvSpPr>
+          <p:cNvPr id="2" name="Title 1">
+            <a:extLst>
+              <a:ext uri="{FF2B5EF4-FFF2-40B4-BE49-F238E27FC236}">
+                <a16:creationId xmlns:a16="http://schemas.microsoft.com/office/drawing/2014/main" id="{2656D1A3-12DA-659E-743B-B21B4AC4F7E2}"/>
+              </a:ext>
+            </a:extLst>
+          </p:cNvPr>
+          <p:cNvSpPr>
+            <a:spLocks noGrp="1"/>
+          </p:cNvSpPr>
+          <p:nvPr>
+            <p:ph type="title"/>
+          </p:nvPr>
+        </p:nvSpPr>
+        <p:spPr/>
+        <p:txBody>
+          <a:bodyPr/>
+          <a:lstStyle/>
+          <a:p>
+            <a:r>
+              <a:rPr lang="en-US" dirty="0"/>
+              <a:t>Welcome</a:t>
+            </a:r>
+          </a:p>
+        </p:txBody>
+      </p:sp>
+      <p:sp>
+        <p:nvSpPr>
+          <p:cNvPr id="3" name="Content Placeholder 2">
+            <a:extLst>
+              <a:ext uri="{FF2B5EF4-FFF2-40B4-BE49-F238E27FC236}">
+                <a16:creationId xmlns:a16="http://schemas.microsoft.com/office/drawing/2014/main" id="{8B8D9189-CF70-C09C-F7BF-A766BD540E07}"/>
+              </a:ext>
+            </a:extLst>
+          </p:cNvPr>
+          <p:cNvSpPr>
+            <a:spLocks noGrp="1"/>
+          </p:cNvSpPr>
+          <p:nvPr>
+            <p:ph idx="1"/>
+          </p:nvPr>
+        </p:nvSpPr>
+        <p:spPr>
+          <a:xfrm>
+            <a:off x="1134616" y="935831"/>
+            <a:ext cx="9922767" cy="5350669"/>
+          </a:xfrm>
+        </p:spPr>
+        <p:txBody>
+          <a:bodyPr>
+            <a:normAutofit/>
+          </a:bodyPr>
+          <a:lstStyle/>
+          <a:p>
+            <a:pPr marL="274320" lvl="1" indent="0" algn="ctr">
+              <a:buNone/>
+            </a:pPr>
+            <a:r>
+              <a:rPr lang="en-US" sz="2400" dirty="0"/>
+              <a:t>Richard Hoehn</a:t>
+            </a:r>
+          </a:p>
+          <a:p>
+            <a:pPr marL="274320" lvl="1" indent="0" algn="ctr">
+              <a:buNone/>
+            </a:pPr>
+            <a:r>
+              <a:rPr lang="en-US" sz="1200" dirty="0"/>
+              <a:t>●</a:t>
+            </a:r>
+          </a:p>
+          <a:p>
+            <a:pPr marL="274320" lvl="1" indent="0" algn="ctr">
+              <a:buNone/>
+            </a:pPr>
+            <a:r>
+              <a:rPr lang="en-US" sz="2400" dirty="0"/>
+              <a:t>Living Franklin</a:t>
+            </a:r>
+          </a:p>
+          <a:p>
+            <a:pPr marL="274320" lvl="1" indent="0" algn="ctr">
+              <a:buNone/>
+            </a:pPr>
+            <a:r>
+              <a:rPr lang="en-US" sz="1200" dirty="0"/>
+              <a:t>●</a:t>
+            </a:r>
+          </a:p>
+          <a:p>
+            <a:pPr marL="274320" lvl="1" indent="0" algn="ctr">
+              <a:buNone/>
+            </a:pPr>
+            <a:r>
+              <a:rPr lang="en-US" sz="2400" dirty="0"/>
+              <a:t>MTSU Grad 2005, Vanderbilt Grad 2009</a:t>
+            </a:r>
+          </a:p>
+          <a:p>
+            <a:pPr marL="274320" lvl="1" indent="0" algn="ctr">
+              <a:buNone/>
+            </a:pPr>
+            <a:r>
+              <a:rPr lang="en-US" sz="1200" dirty="0"/>
+              <a:t>●</a:t>
+            </a:r>
+          </a:p>
+          <a:p>
+            <a:pPr marL="274320" lvl="1" indent="0" algn="ctr">
+              <a:buNone/>
+            </a:pPr>
+            <a:r>
+              <a:rPr lang="en-US" sz="2400" dirty="0"/>
+              <a:t>Last 15 years in SW development for Retail &amp; Logistics Applications</a:t>
+            </a:r>
+          </a:p>
+          <a:p>
+            <a:pPr marL="274320" lvl="1" indent="0" algn="ctr">
+              <a:buNone/>
+            </a:pPr>
+            <a:r>
+              <a:rPr lang="en-US" sz="1200" dirty="0"/>
+              <a:t>●</a:t>
+            </a:r>
+            <a:br>
+              <a:rPr lang="en-US" sz="2400" dirty="0"/>
+            </a:br>
+            <a:r>
+              <a:rPr lang="en-US" sz="2400" dirty="0"/>
+              <a:t>Primarily in Databases, API / </a:t>
+            </a:r>
+            <a:r>
+              <a:rPr lang="en-US" sz="2400" dirty="0" err="1"/>
+              <a:t>PubSub</a:t>
+            </a:r>
+            <a:r>
+              <a:rPr lang="en-US" sz="2400" dirty="0"/>
+              <a:t> Integration Work, and Business Reporting Apps</a:t>
+            </a:r>
+          </a:p>
+          <a:p>
+            <a:pPr marL="0" indent="0" algn="ctr">
+              <a:buNone/>
+            </a:pPr>
+            <a:endParaRPr lang="en-US" sz="2400" dirty="0"/>
+          </a:p>
+          <a:p>
+            <a:pPr algn="ctr"/>
+            <a:endParaRPr lang="en-US" sz="2400" dirty="0"/>
+          </a:p>
+        </p:txBody>
+      </p:sp>
+    </p:spTree>
+    <p:extLst>
+      <p:ext uri="{BB962C8B-B14F-4D97-AF65-F5344CB8AC3E}">
+        <p14:creationId xmlns:p14="http://schemas.microsoft.com/office/powerpoint/2010/main" val="3526857811"/>
+      </p:ext>
+    </p:extLst>
+  </p:cSld>
+  <p:clrMapOvr>
+    <a:masterClrMapping/>
+  </p:clrMapOvr>
+</p:sld>
+</file>
+
+<file path=ppt/slides/slide20.xml><?xml version="1.0" encoding="utf-8"?>
 <p:sld xmlns:a="http://schemas.openxmlformats.org/drawingml/2006/main" xmlns:r="http://schemas.openxmlformats.org/officeDocument/2006/relationships" xmlns:p="http://schemas.openxmlformats.org/presentationml/2006/main">
   <p:cSld>
     <p:spTree>
@@ -25120,191 +25427,7 @@
 </p:sld>
 </file>
 
-<file path=ppt/slides/slide2.xml><?xml version="1.0" encoding="utf-8"?>
-<p:sld xmlns:a="http://schemas.openxmlformats.org/drawingml/2006/main" xmlns:r="http://schemas.openxmlformats.org/officeDocument/2006/relationships" xmlns:p="http://schemas.openxmlformats.org/presentationml/2006/main">
-  <p:cSld>
-    <p:spTree>
-      <p:nvGrpSpPr>
-        <p:cNvPr id="1" name=""/>
-        <p:cNvGrpSpPr/>
-        <p:nvPr/>
-      </p:nvGrpSpPr>
-      <p:grpSpPr>
-        <a:xfrm>
-          <a:off x="0" y="0"/>
-          <a:ext cx="0" cy="0"/>
-          <a:chOff x="0" y="0"/>
-          <a:chExt cx="0" cy="0"/>
-        </a:xfrm>
-      </p:grpSpPr>
-      <p:sp>
-        <p:nvSpPr>
-          <p:cNvPr id="2" name="Title 1">
-            <a:extLst>
-              <a:ext uri="{FF2B5EF4-FFF2-40B4-BE49-F238E27FC236}">
-                <a16:creationId xmlns:a16="http://schemas.microsoft.com/office/drawing/2014/main" id="{2656D1A3-12DA-659E-743B-B21B4AC4F7E2}"/>
-              </a:ext>
-            </a:extLst>
-          </p:cNvPr>
-          <p:cNvSpPr>
-            <a:spLocks noGrp="1"/>
-          </p:cNvSpPr>
-          <p:nvPr>
-            <p:ph type="title"/>
-          </p:nvPr>
-        </p:nvSpPr>
-        <p:spPr/>
-        <p:txBody>
-          <a:bodyPr/>
-          <a:lstStyle/>
-          <a:p>
-            <a:r>
-              <a:rPr lang="en-US" dirty="0"/>
-              <a:t>Hello</a:t>
-            </a:r>
-          </a:p>
-        </p:txBody>
-      </p:sp>
-      <p:sp>
-        <p:nvSpPr>
-          <p:cNvPr id="3" name="Content Placeholder 2">
-            <a:extLst>
-              <a:ext uri="{FF2B5EF4-FFF2-40B4-BE49-F238E27FC236}">
-                <a16:creationId xmlns:a16="http://schemas.microsoft.com/office/drawing/2014/main" id="{8B8D9189-CF70-C09C-F7BF-A766BD540E07}"/>
-              </a:ext>
-            </a:extLst>
-          </p:cNvPr>
-          <p:cNvSpPr>
-            <a:spLocks noGrp="1"/>
-          </p:cNvSpPr>
-          <p:nvPr>
-            <p:ph idx="1"/>
-          </p:nvPr>
-        </p:nvSpPr>
-        <p:spPr>
-          <a:xfrm>
-            <a:off x="1134616" y="935831"/>
-            <a:ext cx="9922767" cy="5350669"/>
-          </a:xfrm>
-        </p:spPr>
-        <p:txBody>
-          <a:bodyPr>
-            <a:normAutofit fontScale="92500"/>
-          </a:bodyPr>
-          <a:lstStyle/>
-          <a:p>
-            <a:pPr marL="274320" lvl="1" indent="0" algn="ctr">
-              <a:buNone/>
-            </a:pPr>
-            <a:r>
-              <a:rPr lang="en-US" sz="2400" dirty="0"/>
-              <a:t>Richard Hoehn</a:t>
-            </a:r>
-          </a:p>
-          <a:p>
-            <a:pPr marL="274320" lvl="1" indent="0" algn="ctr">
-              <a:buNone/>
-            </a:pPr>
-            <a:r>
-              <a:rPr lang="en-US" sz="2400" dirty="0"/>
-              <a:t>●</a:t>
-            </a:r>
-          </a:p>
-          <a:p>
-            <a:pPr marL="274320" lvl="1" indent="0" algn="ctr">
-              <a:buNone/>
-            </a:pPr>
-            <a:r>
-              <a:rPr lang="en-US" sz="2400" dirty="0"/>
-              <a:t>Living Franklin</a:t>
-            </a:r>
-          </a:p>
-          <a:p>
-            <a:pPr marL="274320" lvl="1" indent="0" algn="ctr">
-              <a:buNone/>
-            </a:pPr>
-            <a:r>
-              <a:rPr lang="en-US" sz="2400" dirty="0"/>
-              <a:t>●</a:t>
-            </a:r>
-          </a:p>
-          <a:p>
-            <a:pPr marL="274320" lvl="1" indent="0" algn="ctr">
-              <a:buNone/>
-            </a:pPr>
-            <a:r>
-              <a:rPr lang="en-US" sz="2400" dirty="0"/>
-              <a:t>MTSU Grad 2005, Vanderbilt Grad 2009</a:t>
-            </a:r>
-          </a:p>
-          <a:p>
-            <a:pPr marL="274320" lvl="1" indent="0" algn="ctr">
-              <a:buNone/>
-            </a:pPr>
-            <a:r>
-              <a:rPr lang="en-US" sz="2400" dirty="0"/>
-              <a:t>●</a:t>
-            </a:r>
-          </a:p>
-          <a:p>
-            <a:pPr marL="274320" lvl="1" indent="0" algn="ctr">
-              <a:buNone/>
-            </a:pPr>
-            <a:r>
-              <a:rPr lang="en-US" sz="2400" dirty="0"/>
-              <a:t>Last 15 years in SW development for Retail &amp; Logistics Applications</a:t>
-            </a:r>
-          </a:p>
-          <a:p>
-            <a:pPr marL="274320" lvl="1" indent="0" algn="ctr">
-              <a:buNone/>
-            </a:pPr>
-            <a:r>
-              <a:rPr lang="en-US" sz="2400" dirty="0"/>
-              <a:t>●</a:t>
-            </a:r>
-            <a:br>
-              <a:rPr lang="en-US" sz="2400" dirty="0"/>
-            </a:br>
-            <a:r>
-              <a:rPr lang="en-US" sz="2400" dirty="0"/>
-              <a:t>Primarily in Databases, API / </a:t>
-            </a:r>
-            <a:r>
-              <a:rPr lang="en-US" sz="2400" dirty="0" err="1"/>
-              <a:t>PubSub</a:t>
-            </a:r>
-            <a:r>
-              <a:rPr lang="en-US" sz="2400" dirty="0"/>
-              <a:t> Integration Work, and Business Reporting Apps</a:t>
-            </a:r>
-          </a:p>
-          <a:p>
-            <a:pPr marL="0" indent="0" algn="ctr">
-              <a:buNone/>
-            </a:pPr>
-            <a:endParaRPr lang="en-US" sz="2400" dirty="0"/>
-          </a:p>
-          <a:p>
-            <a:pPr algn="ctr"/>
-            <a:endParaRPr lang="en-US" sz="2400" dirty="0"/>
-          </a:p>
-        </p:txBody>
-      </p:sp>
-    </p:spTree>
-    <p:extLst>
-      <p:ext uri="{BB962C8B-B14F-4D97-AF65-F5344CB8AC3E}">
-        <p14:creationId xmlns:p14="http://schemas.microsoft.com/office/powerpoint/2010/main" val="3526857811"/>
-      </p:ext>
-    </p:extLst>
-  </p:cSld>
-  <p:clrMapOvr>
-    <a:masterClrMapping/>
-  </p:clrMapOvr>
-</p:sld>
-</file>
-
-<file path=ppt/slides/slide20.xml><?xml version="1.0" encoding="utf-8"?>
+<file path=ppt/slides/slide21.xml><?xml version="1.0" encoding="utf-8"?>
 <p:sld xmlns:a="http://schemas.openxmlformats.org/drawingml/2006/main" xmlns:r="http://schemas.openxmlformats.org/officeDocument/2006/relationships" xmlns:p="http://schemas.openxmlformats.org/presentationml/2006/main">
   <p:cSld>
     <p:spTree>
@@ -25386,7 +25509,11 @@
           <a:p>
             <a:r>
               <a:rPr lang="en-US" dirty="0"/>
-              <a:t>Very low Prediction Rates where processed </a:t>
+              <a:t>Very low Prediction Rates were achieved during testing! </a:t>
+            </a:r>
+            <a:r>
+              <a:rPr lang="en-US" u="sng" dirty="0"/>
+              <a:t>Disappointing</a:t>
             </a:r>
           </a:p>
           <a:p>
@@ -25411,8 +25538,12 @@
           </a:p>
           <a:p>
             <a:r>
+              <a:rPr lang="en-US" dirty="0" err="1"/>
+              <a:t>Initally</a:t>
+            </a:r>
+            <a:r>
               <a:rPr lang="en-US" dirty="0"/>
-              <a:t> </a:t>
+              <a:t> the GLM predicts better but the F1 Score is higher on RFC</a:t>
             </a:r>
           </a:p>
         </p:txBody>
@@ -25520,7 +25651,7 @@
 </p:sld>
 </file>
 
-<file path=ppt/slides/slide21.xml><?xml version="1.0" encoding="utf-8"?>
+<file path=ppt/slides/slide22.xml><?xml version="1.0" encoding="utf-8"?>
 <p:sld xmlns:a="http://schemas.openxmlformats.org/drawingml/2006/main" xmlns:r="http://schemas.openxmlformats.org/officeDocument/2006/relationships" xmlns:p="http://schemas.openxmlformats.org/presentationml/2006/main">
   <p:cSld>
     <p:spTree>
@@ -25637,35 +25768,7 @@
             </a:pPr>
             <a:r>
               <a:rPr lang="en-US" sz="2000" b="1" dirty="0"/>
-              <a:t>Overall the prediction results from all trained models is disappointing.</a:t>
-            </a:r>
-          </a:p>
-          <a:p>
-            <a:r>
-              <a:rPr lang="en-US" dirty="0"/>
-              <a:t>Although in the previous slide the GLM model predicted better on both German &amp; English, I believe that:</a:t>
-            </a:r>
-          </a:p>
-          <a:p>
-            <a:pPr lvl="1"/>
-            <a:r>
-              <a:rPr lang="en-US" u="sng" dirty="0"/>
-              <a:t>NB on German</a:t>
-            </a:r>
-            <a:r>
-              <a:rPr lang="en-US" dirty="0"/>
-              <a:t> performed better due to the distribution of TP values</a:t>
-            </a:r>
-          </a:p>
-          <a:p>
-            <a:pPr lvl="1"/>
-            <a:r>
-              <a:rPr lang="en-US" u="sng" dirty="0"/>
-              <a:t>RFC on English</a:t>
-            </a:r>
-            <a:r>
-              <a:rPr lang="en-US" dirty="0"/>
-              <a:t> performed better due to the distribution of TP values</a:t>
+              <a:t>Overall the prediction results from all trained models is Disappointing.</a:t>
             </a:r>
           </a:p>
           <a:p>
@@ -25674,7 +25777,41 @@
             </a:pPr>
             <a:r>
               <a:rPr lang="en-US" dirty="0"/>
-              <a:t>There’s an absence of context for the models to operate effectively and grasp the intricate nuances of both the English and German languages.</a:t>
+              <a:t>Although in the previous slide the GLM model predicted better on both German &amp; English, I believe that:</a:t>
+            </a:r>
+          </a:p>
+          <a:p>
+            <a:pPr marL="274320" lvl="1" indent="0">
+              <a:buNone/>
+            </a:pPr>
+            <a:r>
+              <a:rPr lang="en-US" b="1" u="sng" dirty="0"/>
+              <a:t>NB on German</a:t>
+            </a:r>
+            <a:r>
+              <a:rPr lang="en-US" b="1" dirty="0"/>
+              <a:t> </a:t>
+            </a:r>
+            <a:r>
+              <a:rPr lang="en-US" dirty="0"/>
+              <a:t>performed better due to the distribution of TP values</a:t>
+            </a:r>
+          </a:p>
+          <a:p>
+            <a:pPr marL="274320" lvl="1" indent="0">
+              <a:buNone/>
+            </a:pPr>
+            <a:r>
+              <a:rPr lang="en-US" b="1" u="sng" dirty="0"/>
+              <a:t>RFC on English</a:t>
+            </a:r>
+            <a:r>
+              <a:rPr lang="en-US" b="1" dirty="0"/>
+              <a:t> </a:t>
+            </a:r>
+            <a:r>
+              <a:rPr lang="en-US" dirty="0"/>
+              <a:t>performed better due to the distribution of TP values</a:t>
             </a:r>
           </a:p>
           <a:p>
@@ -25683,11 +25820,28 @@
             </a:pPr>
             <a:r>
               <a:rPr lang="en-US" dirty="0"/>
-              <a:t>Secondly, in cases where class data is lacking, the models tend to memorize existing sentences[10], rather than </a:t>
+              <a:t>There’s an absence of context for the models to operate effectively and grasp the intricate nuances of both the English and German languages.</a:t>
+            </a:r>
+          </a:p>
+          <a:p>
+            <a:pPr marL="0" indent="0">
+              <a:buNone/>
+            </a:pPr>
+            <a:r>
+              <a:rPr lang="en-US" dirty="0"/>
+              <a:t>Secondly, in cases where class data is lacking, the models tend to </a:t>
             </a:r>
             <a:r>
               <a:rPr lang="en-US" u="sng" dirty="0"/>
-              <a:t>learning</a:t>
+              <a:t>memorize existing </a:t>
+            </a:r>
+            <a:r>
+              <a:rPr lang="en-US" dirty="0"/>
+              <a:t>sentences[10], rather than </a:t>
+            </a:r>
+            <a:r>
+              <a:rPr lang="en-US" u="sng" dirty="0"/>
+              <a:t>learn</a:t>
             </a:r>
             <a:r>
               <a:rPr lang="en-US" dirty="0"/>
@@ -25712,7 +25866,7 @@
 </p:sld>
 </file>
 
-<file path=ppt/slides/slide22.xml><?xml version="1.0" encoding="utf-8"?>
+<file path=ppt/slides/slide23.xml><?xml version="1.0" encoding="utf-8"?>
 <p:sld xmlns:a="http://schemas.openxmlformats.org/drawingml/2006/main" xmlns:r="http://schemas.openxmlformats.org/officeDocument/2006/relationships" xmlns:p="http://schemas.openxmlformats.org/presentationml/2006/main">
   <p:cSld>
     <p:spTree>
@@ -25913,7 +26067,7 @@
 </p:sld>
 </file>
 
-<file path=ppt/slides/slide23.xml><?xml version="1.0" encoding="utf-8"?>
+<file path=ppt/slides/slide24.xml><?xml version="1.0" encoding="utf-8"?>
 <p:sld xmlns:a="http://schemas.openxmlformats.org/drawingml/2006/main" xmlns:r="http://schemas.openxmlformats.org/officeDocument/2006/relationships" xmlns:p="http://schemas.openxmlformats.org/presentationml/2006/main">
   <p:cSld>
     <p:spTree>
@@ -25977,12 +26131,12 @@
         <p:spPr>
           <a:xfrm>
             <a:off x="1134616" y="876925"/>
-            <a:ext cx="10872505" cy="5409575"/>
+            <a:ext cx="9557629" cy="5409575"/>
           </a:xfrm>
         </p:spPr>
         <p:txBody>
           <a:bodyPr>
-            <a:normAutofit lnSpcReduction="10000"/>
+            <a:normAutofit fontScale="92500" lnSpcReduction="10000"/>
           </a:bodyPr>
           <a:lstStyle/>
           <a:p>
@@ -25998,7 +26152,21 @@
             </a:br>
             <a:r>
               <a:rPr lang="en-US" dirty="0"/>
-              <a:t>No significant improvements through translation in order to extend the dataset, improved prediction results. We believe one of the main culprits is that the data for learning based on eight classes was insufficient. </a:t>
+              <a:t>No significant improvements through translation by extending the</a:t>
+            </a:r>
+            <a:br>
+              <a:rPr lang="en-US" dirty="0"/>
+            </a:br>
+            <a:r>
+              <a:rPr lang="en-US" dirty="0"/>
+              <a:t>dataset improved prediction results. We believe one of the main culprits</a:t>
+            </a:r>
+            <a:br>
+              <a:rPr lang="en-US" dirty="0"/>
+            </a:br>
+            <a:r>
+              <a:rPr lang="en-US" dirty="0"/>
+              <a:t>is that the data for learning based on eight classes was insufficient. </a:t>
             </a:r>
           </a:p>
           <a:p>
@@ -26045,6 +26213,66 @@
           </a:p>
         </p:txBody>
       </p:sp>
+      <p:pic>
+        <p:nvPicPr>
+          <p:cNvPr id="14" name="Picture 13" descr="A math equation with black text&#10;&#10;Description automatically generated">
+            <a:extLst>
+              <a:ext uri="{FF2B5EF4-FFF2-40B4-BE49-F238E27FC236}">
+                <a16:creationId xmlns:a16="http://schemas.microsoft.com/office/drawing/2014/main" id="{1AFCBD01-72D9-FAA9-8861-D62C020A1885}"/>
+              </a:ext>
+            </a:extLst>
+          </p:cNvPr>
+          <p:cNvPicPr>
+            <a:picLocks noChangeAspect="1"/>
+          </p:cNvPicPr>
+          <p:nvPr/>
+        </p:nvPicPr>
+        <p:blipFill>
+          <a:blip r:embed="rId2"/>
+          <a:stretch>
+            <a:fillRect/>
+          </a:stretch>
+        </p:blipFill>
+        <p:spPr>
+          <a:xfrm>
+            <a:off x="8530434" y="1040991"/>
+            <a:ext cx="3373120" cy="1097280"/>
+          </a:xfrm>
+          <a:prstGeom prst="rect">
+            <a:avLst/>
+          </a:prstGeom>
+          <a:solidFill>
+            <a:srgbClr val="FFFFFF">
+              <a:shade val="85000"/>
+            </a:srgbClr>
+          </a:solidFill>
+          <a:ln w="88900" cap="sq">
+            <a:solidFill>
+              <a:srgbClr val="FFFFFF"/>
+            </a:solidFill>
+            <a:miter lim="800000"/>
+          </a:ln>
+          <a:effectLst>
+            <a:outerShdw blurRad="55000" dist="18000" dir="5400000" algn="tl" rotWithShape="0">
+              <a:srgbClr val="000000">
+                <a:alpha val="40000"/>
+              </a:srgbClr>
+            </a:outerShdw>
+          </a:effectLst>
+          <a:scene3d>
+            <a:camera prst="orthographicFront"/>
+            <a:lightRig rig="twoPt" dir="t">
+              <a:rot lat="0" lon="0" rev="7200000"/>
+            </a:lightRig>
+          </a:scene3d>
+          <a:sp3d>
+            <a:bevelT w="25400" h="19050"/>
+            <a:contourClr>
+              <a:srgbClr val="FFFFFF"/>
+            </a:contourClr>
+          </a:sp3d>
+        </p:spPr>
+      </p:pic>
     </p:spTree>
     <p:extLst>
       <p:ext uri="{BB962C8B-B14F-4D97-AF65-F5344CB8AC3E}">
@@ -26058,7 +26286,7 @@
 </p:sld>
 </file>
 
-<file path=ppt/slides/slide24.xml><?xml version="1.0" encoding="utf-8"?>
+<file path=ppt/slides/slide25.xml><?xml version="1.0" encoding="utf-8"?>
 <p:sld xmlns:a="http://schemas.openxmlformats.org/drawingml/2006/main" xmlns:r="http://schemas.openxmlformats.org/officeDocument/2006/relationships" xmlns:p="http://schemas.openxmlformats.org/presentationml/2006/main">
   <p:cSld>
     <p:spTree>
@@ -26156,7 +26384,7 @@
 </p:sld>
 </file>
 
-<file path=ppt/slides/slide25.xml><?xml version="1.0" encoding="utf-8"?>
+<file path=ppt/slides/slide26.xml><?xml version="1.0" encoding="utf-8"?>
 <p:sld xmlns:a="http://schemas.openxmlformats.org/drawingml/2006/main" xmlns:r="http://schemas.openxmlformats.org/officeDocument/2006/relationships" xmlns:p="http://schemas.openxmlformats.org/presentationml/2006/main">
   <p:cSld>
     <p:spTree>
@@ -26786,76 +27014,84 @@
         </p:nvSpPr>
         <p:spPr>
           <a:xfrm>
-            <a:off x="1134616" y="935831"/>
-            <a:ext cx="10935193" cy="5350669"/>
+            <a:off x="1134617" y="935831"/>
+            <a:ext cx="8873450" cy="5350669"/>
           </a:xfrm>
         </p:spPr>
         <p:txBody>
-          <a:bodyPr/>
+          <a:bodyPr>
+            <a:normAutofit fontScale="92500"/>
+          </a:bodyPr>
           <a:lstStyle/>
           <a:p>
+            <a:pPr marL="0" indent="0">
+              <a:buNone/>
+            </a:pPr>
             <a:r>
               <a:rPr lang="en-US" b="1" dirty="0"/>
               <a:t>Introduction</a:t>
             </a:r>
           </a:p>
           <a:p>
-            <a:pPr lvl="1"/>
             <a:r>
               <a:rPr lang="en-US" dirty="0"/>
-              <a:t>Research on Emotion Detection (ED) in Text and improving Prediction Rates</a:t>
+              <a:t>Research on Emotion Detection (ED) in Text with an emphasis improving Prediction Rates</a:t>
             </a:r>
           </a:p>
           <a:p>
-            <a:pPr lvl="1"/>
             <a:r>
               <a:rPr lang="en-US" dirty="0"/>
-              <a:t>Specifically by extending Data through Translation to Different Languages</a:t>
+              <a:t>Specifically by extending Data through </a:t>
+            </a:r>
+            <a:r>
+              <a:rPr lang="en-US" u="sng" dirty="0"/>
+              <a:t>Translation to Different Languages</a:t>
             </a:r>
           </a:p>
           <a:p>
-            <a:pPr lvl="1"/>
             <a:r>
               <a:rPr lang="en-US" dirty="0"/>
-              <a:t>Training Multiple ML Models on Original &amp; Extended Data to Compare Prediction Rates</a:t>
+              <a:t>Training Multiple ML Models on Original &amp; Extended Data to </a:t>
+            </a:r>
+            <a:r>
+              <a:rPr lang="en-US" u="sng" dirty="0"/>
+              <a:t>Compare Prediction Rates</a:t>
             </a:r>
           </a:p>
           <a:p>
-            <a:pPr lvl="1"/>
             <a:r>
               <a:rPr lang="en-US" dirty="0"/>
               <a:t>and Finally in Real-Time Translate Text to process in Parallel for further expansion</a:t>
             </a:r>
           </a:p>
           <a:p>
+            <a:pPr marL="0" indent="0">
+              <a:buNone/>
+            </a:pPr>
             <a:r>
               <a:rPr lang="en-US" b="1" dirty="0"/>
               <a:t>Agenda</a:t>
             </a:r>
           </a:p>
           <a:p>
-            <a:pPr lvl="1"/>
             <a:r>
               <a:rPr lang="en-US" dirty="0"/>
               <a:t>Significance of Emotion Detection</a:t>
             </a:r>
           </a:p>
           <a:p>
-            <a:pPr lvl="1"/>
             <a:r>
               <a:rPr lang="en-US" dirty="0"/>
               <a:t>Challenges, Motivation and Scope of Research</a:t>
             </a:r>
           </a:p>
           <a:p>
-            <a:pPr lvl="1"/>
             <a:r>
               <a:rPr lang="en-US" dirty="0"/>
               <a:t>Methodology – Including Code Review and Demonstration!</a:t>
             </a:r>
           </a:p>
           <a:p>
-            <a:pPr lvl="1"/>
             <a:r>
               <a:rPr lang="en-US" dirty="0"/>
               <a:t>and finally Analysis of Results, Conclusion, and Future Work</a:t>
@@ -26873,65 +27109,6 @@
           </a:p>
         </p:txBody>
       </p:sp>
-      <p:pic>
-        <p:nvPicPr>
-          <p:cNvPr id="7" name="Picture 6" descr="A screenshot of a computer&#10;&#10;Description automatically generated">
-            <a:extLst>
-              <a:ext uri="{FF2B5EF4-FFF2-40B4-BE49-F238E27FC236}">
-                <a16:creationId xmlns:a16="http://schemas.microsoft.com/office/drawing/2014/main" id="{EA84B683-B3BF-0867-323E-AFD14932EA41}"/>
-              </a:ext>
-            </a:extLst>
-          </p:cNvPr>
-          <p:cNvPicPr>
-            <a:picLocks noChangeAspect="1"/>
-          </p:cNvPicPr>
-          <p:nvPr/>
-        </p:nvPicPr>
-        <p:blipFill>
-          <a:blip r:embed="rId2"/>
-          <a:stretch>
-            <a:fillRect/>
-          </a:stretch>
-        </p:blipFill>
-        <p:spPr>
-          <a:xfrm>
-            <a:off x="8940208" y="3343275"/>
-            <a:ext cx="3136828" cy="2753008"/>
-          </a:xfrm>
-          <a:prstGeom prst="rect">
-            <a:avLst/>
-          </a:prstGeom>
-          <a:solidFill>
-            <a:srgbClr val="FFFFFF">
-              <a:shade val="85000"/>
-            </a:srgbClr>
-          </a:solidFill>
-          <a:ln w="190500" cap="rnd">
-            <a:solidFill>
-              <a:srgbClr val="FFFFFF"/>
-            </a:solidFill>
-          </a:ln>
-          <a:effectLst>
-            <a:outerShdw blurRad="36195" dist="12700" dir="11400000" algn="tl" rotWithShape="0">
-              <a:srgbClr val="000000">
-                <a:alpha val="33000"/>
-              </a:srgbClr>
-            </a:outerShdw>
-          </a:effectLst>
-          <a:scene3d>
-            <a:camera prst="perspectiveContrastingLeftFacing">
-              <a:rot lat="540000" lon="2100000" rev="0"/>
-            </a:camera>
-            <a:lightRig rig="soft" dir="t"/>
-          </a:scene3d>
-          <a:sp3d contourW="12700" prstMaterial="matte">
-            <a:bevelT w="63500" h="50800"/>
-            <a:contourClr>
-              <a:srgbClr val="C0C0C0"/>
-            </a:contourClr>
-          </a:sp3d>
-        </p:spPr>
-      </p:pic>
     </p:spTree>
     <p:extLst>
       <p:ext uri="{BB962C8B-B14F-4D97-AF65-F5344CB8AC3E}">
@@ -27009,7 +27186,7 @@
         <p:spPr>
           <a:xfrm>
             <a:off x="6841330" y="1050131"/>
-            <a:ext cx="5350670" cy="5022057"/>
+            <a:ext cx="5020703" cy="5022057"/>
           </a:xfrm>
         </p:spPr>
         <p:txBody>
@@ -27018,40 +27195,51 @@
           </a:bodyPr>
           <a:lstStyle/>
           <a:p>
+            <a:pPr marL="0" indent="0">
+              <a:buNone/>
+            </a:pPr>
             <a:r>
               <a:rPr lang="en-US" dirty="0"/>
               <a:t>By accurately identifying and understanding emotions from text data, ML applications can assist in improving:</a:t>
             </a:r>
           </a:p>
           <a:p>
-            <a:pPr lvl="1"/>
             <a:r>
               <a:rPr lang="en-US" dirty="0"/>
               <a:t>User Experiences (chat-bots),</a:t>
             </a:r>
           </a:p>
           <a:p>
-            <a:pPr lvl="1"/>
             <a:r>
               <a:rPr lang="en-US" dirty="0"/>
               <a:t>Decision-Making Processes</a:t>
             </a:r>
           </a:p>
           <a:p>
-            <a:pPr lvl="1"/>
             <a:r>
               <a:rPr lang="en-US" dirty="0"/>
               <a:t>and Overall human-machine interactions in a positive manner[4, 5], with most of these interactions being processed in real-time.</a:t>
             </a:r>
           </a:p>
           <a:p>
+            <a:pPr marL="0" indent="0">
+              <a:buNone/>
+            </a:pPr>
             <a:r>
               <a:rPr lang="en-US" dirty="0"/>
               <a:t>ED is still a growing field in Text, Video, and Image reading. The market for ED software and services is estimated to reach </a:t>
             </a:r>
             <a:r>
               <a:rPr lang="en-US" b="1" dirty="0"/>
-              <a:t>$3.8billion[2] by 2025.</a:t>
+              <a:t>$3.8billion</a:t>
+            </a:r>
+            <a:r>
+              <a:rPr lang="en-US" dirty="0"/>
+              <a:t>[2] by </a:t>
+            </a:r>
+            <a:r>
+              <a:rPr lang="en-US" b="1" dirty="0"/>
+              <a:t>2025.</a:t>
             </a:r>
           </a:p>
           <a:p>
@@ -27251,9 +27439,21 @@
             </a:lvl9pPr>
           </a:lstStyle>
           <a:p>
+            <a:pPr marL="0" indent="0">
+              <a:buNone/>
+            </a:pPr>
             <a:r>
               <a:rPr lang="en-US" dirty="0"/>
-              <a:t>Emotions can vary depending on the theoretical framework or model being considered. One well-known model is the Plutchik’s Wheel of Emotions, which proposes eight (8) primary emotions.</a:t>
+              <a:t>Emotions can vary depending on the framework or model being considered.</a:t>
+            </a:r>
+          </a:p>
+          <a:p>
+            <a:pPr marL="0" indent="0">
+              <a:buNone/>
+            </a:pPr>
+            <a:r>
+              <a:rPr lang="en-US" dirty="0"/>
+              <a:t>One well-known model is the Plutchik’s Wheel of Emotions, which proposes eight (8) primary emotions.</a:t>
             </a:r>
           </a:p>
           <a:p>
@@ -27427,7 +27627,12 @@
             <p:ph idx="1"/>
           </p:nvPr>
         </p:nvSpPr>
-        <p:spPr/>
+        <p:spPr>
+          <a:xfrm>
+            <a:off x="1134616" y="1690914"/>
+            <a:ext cx="8579835" cy="4595586"/>
+          </a:xfrm>
+        </p:spPr>
         <p:txBody>
           <a:bodyPr>
             <a:normAutofit/>
@@ -27436,7 +27641,7 @@
           <a:p>
             <a:r>
               <a:rPr lang="en-US" dirty="0"/>
-              <a:t>Emotion detection data requires primarily supervised learning data!</a:t>
+              <a:t>Emotion detection data requires primarily supervised learning data! Meaning human curated and labeled data.</a:t>
             </a:r>
           </a:p>
           <a:p>
@@ -27448,7 +27653,13 @@
           <a:p>
             <a:r>
               <a:rPr lang="en-US" dirty="0"/>
-              <a:t>Many datasets that are available are in many cases in multiple languages - not all are in English since emotions that are linked to text are contextual in nature.</a:t>
+              <a:t>Many datasets that are available are in many different languages</a:t>
+            </a:r>
+          </a:p>
+          <a:p>
+            <a:r>
+              <a:rPr lang="en-US" dirty="0"/>
+              <a:t>Emotions in text are contextual in nature; meaning they conform in many cases based on the type and language and culture using them.</a:t>
             </a:r>
           </a:p>
         </p:txBody>
@@ -27506,7 +27717,7 @@
           <a:p>
             <a:r>
               <a:rPr lang="en-US" dirty="0"/>
-              <a:t>Motivation for Research and Evaluation of Dataset Extending Impact</a:t>
+              <a:t>Motivation for Research and Evaluation of Dataset Extending for ML Prediction</a:t>
             </a:r>
           </a:p>
         </p:txBody>
@@ -27547,35 +27758,31 @@
           <a:p>
             <a:r>
               <a:rPr lang="en-US" dirty="0"/>
-              <a:t>ED spans most all domains such like psychology, </a:t>
+              <a:t>ED spans most all domains such like psychology, business, and education. </a:t>
             </a:r>
           </a:p>
           <a:p>
             <a:r>
               <a:rPr lang="en-US" dirty="0"/>
-              <a:t>By use of ML models the analysis of human emotions at scale, providing valuable insights into individual and collective emotional states both in real-time but also for measuring sentiments from the past versus the current time.</a:t>
+              <a:t>By use of ML models the analysis of human emotions at scale provides valuable insights into individual and collective emotional states both in real-time but also for measuring sentiments from the past versus the current time.</a:t>
             </a:r>
           </a:p>
           <a:p>
             <a:r>
               <a:rPr lang="en-US" dirty="0"/>
-              <a:t>In </a:t>
-            </a:r>
-            <a:r>
-              <a:rPr lang="en-US" dirty="0" err="1"/>
-              <a:t>Chowanda</a:t>
+              <a:t>A recent paper[1] states that ”</a:t>
+            </a:r>
+            <a:r>
+              <a:rPr lang="en-US" b="1" i="1" dirty="0"/>
+              <a:t>Emotions hold a paramount role in the conversation, as it expresses context to the conversation</a:t>
+            </a:r>
+            <a:r>
+              <a:rPr lang="en-US" b="1" dirty="0"/>
+              <a:t>.</a:t>
             </a:r>
             <a:r>
               <a:rPr lang="en-US" dirty="0"/>
-              <a:t> et al. paper they believe that ”</a:t>
-            </a:r>
-            <a:r>
-              <a:rPr lang="en-US" i="1" dirty="0"/>
-              <a:t>Emotions hold a paramount role in the conversation, as it expresses context to the conversation</a:t>
-            </a:r>
-            <a:r>
-              <a:rPr lang="en-US" dirty="0"/>
-              <a:t>.”, this means that emotions are a part of a conversation and with that are needed to ensure valid analysis of a conversation.</a:t>
+              <a:t>”, this means that emotions are a part of a conversation and with that are needed to ensure valid analysis of a conversation.</a:t>
             </a:r>
           </a:p>
         </p:txBody>
@@ -27661,7 +27868,9 @@
           </a:xfrm>
         </p:spPr>
         <p:txBody>
-          <a:bodyPr/>
+          <a:bodyPr>
+            <a:normAutofit lnSpcReduction="10000"/>
+          </a:bodyPr>
           <a:lstStyle/>
           <a:p>
             <a:pPr marL="0" indent="0">
@@ -27673,18 +27882,30 @@
             </a:r>
           </a:p>
           <a:p>
+            <a:pPr marL="342900" indent="-342900">
+              <a:buFont typeface="+mj-lt"/>
+              <a:buAutoNum type="arabicPeriod"/>
+            </a:pPr>
             <a:r>
               <a:rPr lang="en-US" dirty="0"/>
-              <a:t>The first is to translate English data (feature &amp; label) to German in order to extend the original German dataset for ML training purposes. Will the added text lead to better predictions?</a:t>
+              <a:t>The first is to translate English data (feature &amp; label) to German in order to extend the original German dataset for ML training purposes. With this will the added text lead to better predictions?</a:t>
             </a:r>
           </a:p>
           <a:p>
+            <a:pPr marL="342900" indent="-342900">
+              <a:buFont typeface="+mj-lt"/>
+              <a:buAutoNum type="arabicPeriod"/>
+            </a:pPr>
             <a:r>
               <a:rPr lang="en-US" dirty="0"/>
-              <a:t>Similar to the first, can by translating German data to English and extending an original English dataset increase the predictability of English ML model? </a:t>
+              <a:t>Similarly, can by translating German data to English and extending an original English dataset increase the predictability of English ML model? </a:t>
             </a:r>
           </a:p>
           <a:p>
+            <a:pPr marL="342900" indent="-342900">
+              <a:buFont typeface="+mj-lt"/>
+              <a:buAutoNum type="arabicPeriod"/>
+            </a:pPr>
             <a:r>
               <a:rPr lang="en-US" dirty="0"/>
               <a:t>And Lastly shifting the focus to real-time translation and its impact on prediction. Can by translating in real-time an input to multiple languages improve the predictability based on the combined output of two models.</a:t>
@@ -27699,12 +27920,21 @@
               <a:t>In summary, this research project </a:t>
             </a:r>
             <a:r>
-              <a:rPr lang="en-US" u="sng" dirty="0"/>
-              <a:t>investigated innovative ways </a:t>
+              <a:rPr lang="en-US" b="1" u="sng" dirty="0"/>
+              <a:t>investigated innovative ways</a:t>
             </a:r>
             <a:r>
               <a:rPr lang="en-US" dirty="0"/>
-              <a:t>to enhance the predictability of Emotion Detection models in both English and German. With these three (3) objectives from above the scope was to </a:t>
+              <a:t> to enhance the predictability of Emotion Detection models in English and German.</a:t>
+            </a:r>
+          </a:p>
+          <a:p>
+            <a:pPr marL="0" indent="0">
+              <a:buNone/>
+            </a:pPr>
+            <a:r>
+              <a:rPr lang="en-US" dirty="0"/>
+              <a:t>With these three (3) objectives from above the scope was to </a:t>
             </a:r>
             <a:r>
               <a:rPr lang="en-US" b="1" u="sng" dirty="0"/>
@@ -27836,7 +28066,7 @@
           <a:p>
             <a:r>
               <a:rPr lang="en-US" dirty="0"/>
-              <a:t>Our research considered publication only past 2015, thereby providing an up-to-date perspective on ED analysis.</a:t>
+              <a:t>Our research considered publications only past 2015, thereby providing an up-to-date perspective on ED analysis.</a:t>
             </a:r>
           </a:p>
           <a:p>
@@ -27900,13 +28130,13 @@
             </a:r>
             <a:r>
               <a:rPr lang="en-US" dirty="0"/>
-              <a:t>anguages[6]</a:t>
+              <a:t>anguages[6], which again support our approach of using 2015 and beyond data</a:t>
             </a:r>
           </a:p>
           <a:p>
             <a:r>
               <a:rPr lang="en-US" dirty="0"/>
-              <a:t>Fragmentation caused by different languages further exacerbates the issue, as it reduces the size and diversity of data available for training, resulting in limited cross-lingual generalization and potentially biased models.[7]</a:t>
+              <a:t>Fragmentation caused by different languages further exacerbates the issue of ED, as it reduces the size and diversity of data available for training, resulting in limited cross-lingual generalization and potentially biased models.[7]</a:t>
             </a:r>
           </a:p>
           <a:p>

</xml_diff>